<commit_message>
Presentation summary file into Chart
</commit_message>
<xml_diff>
--- a/first_project/SQL_Project_Submission_By_Hazwinayo.pptx
+++ b/first_project/SQL_Project_Submission_By_Hazwinayo.pptx
@@ -37,7 +37,7 @@
       </p:grpSpPr>
       <p:sp>
         <p:nvSpPr>
-          <p:cNvPr id="40" name="PlaceHolder 1"/>
+          <p:cNvPr id="39" name="PlaceHolder 1"/>
           <p:cNvSpPr>
             <a:spLocks noGrp="1"/>
           </p:cNvSpPr>
@@ -57,27 +57,22 @@
         <p:txBody>
           <a:bodyPr lIns="0" rIns="0" tIns="0" bIns="0" anchor="ctr"/>
           <a:p>
-            <a:r>
-              <a:rPr b="0" lang="en-US" sz="1400" spc="-1" strike="noStrike">
-                <a:solidFill>
-                  <a:srgbClr val="000000"/>
-                </a:solidFill>
+            <a:pPr algn="ctr"/>
+            <a:r>
+              <a:rPr b="0" lang="en-US" sz="4400" spc="-1" strike="noStrike">
                 <a:latin typeface="Arial"/>
               </a:rPr>
               <a:t>Click to move the slide</a:t>
             </a:r>
-            <a:endParaRPr b="0" lang="en-US" sz="1400" spc="-1" strike="noStrike">
-              <a:solidFill>
-                <a:srgbClr val="000000"/>
-              </a:solidFill>
-              <a:latin typeface="Arial"/>
-            </a:endParaRPr>
-          </a:p>
-        </p:txBody>
-      </p:sp>
-      <p:sp>
-        <p:nvSpPr>
-          <p:cNvPr id="41" name="PlaceHolder 2"/>
+            <a:endParaRPr b="0" lang="en-US" sz="4400" spc="-1" strike="noStrike">
+              <a:latin typeface="Arial"/>
+            </a:endParaRPr>
+          </a:p>
+        </p:txBody>
+      </p:sp>
+      <p:sp>
+        <p:nvSpPr>
+          <p:cNvPr id="40" name="PlaceHolder 2"/>
           <p:cNvSpPr>
             <a:spLocks noGrp="1"/>
           </p:cNvSpPr>
@@ -111,7 +106,7 @@
       </p:sp>
       <p:sp>
         <p:nvSpPr>
-          <p:cNvPr id="42" name="PlaceHolder 3"/>
+          <p:cNvPr id="41" name="PlaceHolder 3"/>
           <p:cNvSpPr>
             <a:spLocks noGrp="1"/>
           </p:cNvSpPr>
@@ -145,7 +140,7 @@
       </p:sp>
       <p:sp>
         <p:nvSpPr>
-          <p:cNvPr id="43" name="PlaceHolder 4"/>
+          <p:cNvPr id="42" name="PlaceHolder 4"/>
           <p:cNvSpPr>
             <a:spLocks noGrp="1"/>
           </p:cNvSpPr>
@@ -180,7 +175,7 @@
       </p:sp>
       <p:sp>
         <p:nvSpPr>
-          <p:cNvPr id="44" name="PlaceHolder 5"/>
+          <p:cNvPr id="43" name="PlaceHolder 5"/>
           <p:cNvSpPr>
             <a:spLocks noGrp="1"/>
           </p:cNvSpPr>
@@ -214,7 +209,7 @@
       </p:sp>
       <p:sp>
         <p:nvSpPr>
-          <p:cNvPr id="45" name="PlaceHolder 6"/>
+          <p:cNvPr id="44" name="PlaceHolder 6"/>
           <p:cNvSpPr>
             <a:spLocks noGrp="1"/>
           </p:cNvSpPr>
@@ -235,7 +230,7 @@
           <a:bodyPr lIns="0" rIns="0" tIns="0" bIns="0" anchor="b"/>
           <a:p>
             <a:pPr algn="r"/>
-            <a:fld id="{80BA8F25-82AB-4182-85B5-AF7BAF24AFA2}" type="slidenum">
+            <a:fld id="{CA5961DF-10B7-4340-B792-F8F766179F69}" type="slidenum">
               <a:rPr b="0" lang="en-US" sz="1400" spc="-1" strike="noStrike">
                 <a:latin typeface="Times New Roman"/>
               </a:rPr>
@@ -272,7 +267,7 @@
       </p:grpSpPr>
       <p:sp>
         <p:nvSpPr>
-          <p:cNvPr id="62" name="PlaceHolder 1"/>
+          <p:cNvPr id="60" name="PlaceHolder 1"/>
           <p:cNvSpPr>
             <a:spLocks noGrp="1"/>
           </p:cNvSpPr>
@@ -283,16 +278,16 @@
         <p:spPr>
           <a:xfrm>
             <a:off x="380880" y="685800"/>
-            <a:ext cx="6095520" cy="3428640"/>
-          </a:xfrm>
-          <a:prstGeom prst="rect">
-            <a:avLst/>
-          </a:prstGeom>
-        </p:spPr>
-      </p:sp>
-      <p:sp>
-        <p:nvSpPr>
-          <p:cNvPr id="63" name="PlaceHolder 2"/>
+            <a:ext cx="6095160" cy="3428280"/>
+          </a:xfrm>
+          <a:prstGeom prst="rect">
+            <a:avLst/>
+          </a:prstGeom>
+        </p:spPr>
+      </p:sp>
+      <p:sp>
+        <p:nvSpPr>
+          <p:cNvPr id="61" name="PlaceHolder 2"/>
           <p:cNvSpPr>
             <a:spLocks noGrp="1"/>
           </p:cNvSpPr>
@@ -303,16 +298,16 @@
         <p:spPr>
           <a:xfrm>
             <a:off x="685800" y="4343400"/>
-            <a:ext cx="5486040" cy="4114440"/>
-          </a:xfrm>
-          <a:prstGeom prst="rect">
-            <a:avLst/>
-          </a:prstGeom>
-        </p:spPr>
-        <p:txBody>
-          <a:bodyPr tIns="91440" bIns="91440"/>
-          <a:p>
-            <a:pPr>
+            <a:ext cx="5485680" cy="4114080"/>
+          </a:xfrm>
+          <a:prstGeom prst="rect">
+            <a:avLst/>
+          </a:prstGeom>
+        </p:spPr>
+        <p:txBody>
+          <a:bodyPr lIns="0" rIns="0" tIns="91440" bIns="91440"/>
+          <a:p>
+            <a:pPr marL="216000" indent="-216000">
               <a:lnSpc>
                 <a:spcPct val="100000"/>
               </a:lnSpc>
@@ -322,7 +317,7 @@
             </a:endParaRPr>
           </a:p>
           <a:p>
-            <a:pPr>
+            <a:pPr marL="216000" indent="-216000">
               <a:lnSpc>
                 <a:spcPct val="100000"/>
               </a:lnSpc>
@@ -342,7 +337,7 @@
             </a:endParaRPr>
           </a:p>
           <a:p>
-            <a:pPr>
+            <a:pPr marL="216000" indent="-216000">
               <a:lnSpc>
                 <a:spcPct val="100000"/>
               </a:lnSpc>
@@ -372,7 +367,7 @@
             </a:endParaRPr>
           </a:p>
           <a:p>
-            <a:pPr>
+            <a:pPr marL="216000" indent="-216000">
               <a:lnSpc>
                 <a:spcPct val="100000"/>
               </a:lnSpc>
@@ -392,7 +387,7 @@
             </a:endParaRPr>
           </a:p>
           <a:p>
-            <a:pPr>
+            <a:pPr marL="216000" indent="-216000">
               <a:lnSpc>
                 <a:spcPct val="100000"/>
               </a:lnSpc>
@@ -412,7 +407,7 @@
             </a:endParaRPr>
           </a:p>
           <a:p>
-            <a:pPr>
+            <a:pPr marL="216000" indent="-216000">
               <a:lnSpc>
                 <a:spcPct val="100000"/>
               </a:lnSpc>
@@ -432,7 +427,7 @@
             </a:endParaRPr>
           </a:p>
           <a:p>
-            <a:pPr>
+            <a:pPr marL="216000" indent="-216000">
               <a:lnSpc>
                 <a:spcPct val="100000"/>
               </a:lnSpc>
@@ -442,7 +437,7 @@
             </a:endParaRPr>
           </a:p>
           <a:p>
-            <a:pPr>
+            <a:pPr marL="216000" indent="-216000">
               <a:lnSpc>
                 <a:spcPct val="100000"/>
               </a:lnSpc>
@@ -487,7 +482,7 @@
       </p:grpSpPr>
       <p:sp>
         <p:nvSpPr>
-          <p:cNvPr id="64" name="PlaceHolder 1"/>
+          <p:cNvPr id="62" name="PlaceHolder 1"/>
           <p:cNvSpPr>
             <a:spLocks noGrp="1"/>
           </p:cNvSpPr>
@@ -498,16 +493,16 @@
         <p:spPr>
           <a:xfrm>
             <a:off x="380880" y="685800"/>
-            <a:ext cx="6095520" cy="3428640"/>
-          </a:xfrm>
-          <a:prstGeom prst="rect">
-            <a:avLst/>
-          </a:prstGeom>
-        </p:spPr>
-      </p:sp>
-      <p:sp>
-        <p:nvSpPr>
-          <p:cNvPr id="65" name="PlaceHolder 2"/>
+            <a:ext cx="6095160" cy="3428280"/>
+          </a:xfrm>
+          <a:prstGeom prst="rect">
+            <a:avLst/>
+          </a:prstGeom>
+        </p:spPr>
+      </p:sp>
+      <p:sp>
+        <p:nvSpPr>
+          <p:cNvPr id="63" name="PlaceHolder 2"/>
           <p:cNvSpPr>
             <a:spLocks noGrp="1"/>
           </p:cNvSpPr>
@@ -518,16 +513,16 @@
         <p:spPr>
           <a:xfrm>
             <a:off x="685800" y="4343400"/>
-            <a:ext cx="5486040" cy="4114440"/>
-          </a:xfrm>
-          <a:prstGeom prst="rect">
-            <a:avLst/>
-          </a:prstGeom>
-        </p:spPr>
-        <p:txBody>
-          <a:bodyPr tIns="91440" bIns="91440"/>
-          <a:p>
-            <a:pPr>
+            <a:ext cx="5485680" cy="4114080"/>
+          </a:xfrm>
+          <a:prstGeom prst="rect">
+            <a:avLst/>
+          </a:prstGeom>
+        </p:spPr>
+        <p:txBody>
+          <a:bodyPr lIns="0" rIns="0" tIns="91440" bIns="91440"/>
+          <a:p>
+            <a:pPr marL="216000" indent="-216000">
               <a:lnSpc>
                 <a:spcPct val="100000"/>
               </a:lnSpc>
@@ -537,7 +532,7 @@
             </a:endParaRPr>
           </a:p>
           <a:p>
-            <a:pPr>
+            <a:pPr marL="216000" indent="-216000">
               <a:lnSpc>
                 <a:spcPct val="100000"/>
               </a:lnSpc>
@@ -557,7 +552,7 @@
             </a:endParaRPr>
           </a:p>
           <a:p>
-            <a:pPr>
+            <a:pPr marL="216000" indent="-216000">
               <a:lnSpc>
                 <a:spcPct val="100000"/>
               </a:lnSpc>
@@ -587,7 +582,7 @@
             </a:endParaRPr>
           </a:p>
           <a:p>
-            <a:pPr>
+            <a:pPr marL="216000" indent="-216000">
               <a:lnSpc>
                 <a:spcPct val="100000"/>
               </a:lnSpc>
@@ -607,7 +602,7 @@
             </a:endParaRPr>
           </a:p>
           <a:p>
-            <a:pPr>
+            <a:pPr marL="216000" indent="-216000">
               <a:lnSpc>
                 <a:spcPct val="100000"/>
               </a:lnSpc>
@@ -627,7 +622,7 @@
             </a:endParaRPr>
           </a:p>
           <a:p>
-            <a:pPr>
+            <a:pPr marL="216000" indent="-216000">
               <a:lnSpc>
                 <a:spcPct val="100000"/>
               </a:lnSpc>
@@ -647,7 +642,7 @@
             </a:endParaRPr>
           </a:p>
           <a:p>
-            <a:pPr>
+            <a:pPr marL="216000" indent="-216000">
               <a:lnSpc>
                 <a:spcPct val="100000"/>
               </a:lnSpc>
@@ -657,7 +652,7 @@
             </a:endParaRPr>
           </a:p>
           <a:p>
-            <a:pPr>
+            <a:pPr marL="216000" indent="-216000">
               <a:lnSpc>
                 <a:spcPct val="100000"/>
               </a:lnSpc>
@@ -702,7 +697,7 @@
       </p:grpSpPr>
       <p:sp>
         <p:nvSpPr>
-          <p:cNvPr id="66" name="PlaceHolder 1"/>
+          <p:cNvPr id="64" name="PlaceHolder 1"/>
           <p:cNvSpPr>
             <a:spLocks noGrp="1"/>
           </p:cNvSpPr>
@@ -713,16 +708,16 @@
         <p:spPr>
           <a:xfrm>
             <a:off x="380880" y="685800"/>
-            <a:ext cx="6095520" cy="3428640"/>
-          </a:xfrm>
-          <a:prstGeom prst="rect">
-            <a:avLst/>
-          </a:prstGeom>
-        </p:spPr>
-      </p:sp>
-      <p:sp>
-        <p:nvSpPr>
-          <p:cNvPr id="67" name="PlaceHolder 2"/>
+            <a:ext cx="6095160" cy="3428280"/>
+          </a:xfrm>
+          <a:prstGeom prst="rect">
+            <a:avLst/>
+          </a:prstGeom>
+        </p:spPr>
+      </p:sp>
+      <p:sp>
+        <p:nvSpPr>
+          <p:cNvPr id="65" name="PlaceHolder 2"/>
           <p:cNvSpPr>
             <a:spLocks noGrp="1"/>
           </p:cNvSpPr>
@@ -733,16 +728,16 @@
         <p:spPr>
           <a:xfrm>
             <a:off x="685800" y="4343400"/>
-            <a:ext cx="5486040" cy="4114440"/>
-          </a:xfrm>
-          <a:prstGeom prst="rect">
-            <a:avLst/>
-          </a:prstGeom>
-        </p:spPr>
-        <p:txBody>
-          <a:bodyPr tIns="91440" bIns="91440"/>
-          <a:p>
-            <a:pPr>
+            <a:ext cx="5485680" cy="4114080"/>
+          </a:xfrm>
+          <a:prstGeom prst="rect">
+            <a:avLst/>
+          </a:prstGeom>
+        </p:spPr>
+        <p:txBody>
+          <a:bodyPr lIns="0" rIns="0" tIns="91440" bIns="91440"/>
+          <a:p>
+            <a:pPr marL="216000" indent="-216000">
               <a:lnSpc>
                 <a:spcPct val="100000"/>
               </a:lnSpc>
@@ -752,7 +747,7 @@
             </a:endParaRPr>
           </a:p>
           <a:p>
-            <a:pPr>
+            <a:pPr marL="216000" indent="-216000">
               <a:lnSpc>
                 <a:spcPct val="100000"/>
               </a:lnSpc>
@@ -772,7 +767,7 @@
             </a:endParaRPr>
           </a:p>
           <a:p>
-            <a:pPr>
+            <a:pPr marL="216000" indent="-216000">
               <a:lnSpc>
                 <a:spcPct val="100000"/>
               </a:lnSpc>
@@ -802,7 +797,7 @@
             </a:endParaRPr>
           </a:p>
           <a:p>
-            <a:pPr>
+            <a:pPr marL="216000" indent="-216000">
               <a:lnSpc>
                 <a:spcPct val="100000"/>
               </a:lnSpc>
@@ -822,7 +817,7 @@
             </a:endParaRPr>
           </a:p>
           <a:p>
-            <a:pPr>
+            <a:pPr marL="216000" indent="-216000">
               <a:lnSpc>
                 <a:spcPct val="100000"/>
               </a:lnSpc>
@@ -842,7 +837,7 @@
             </a:endParaRPr>
           </a:p>
           <a:p>
-            <a:pPr>
+            <a:pPr marL="216000" indent="-216000">
               <a:lnSpc>
                 <a:spcPct val="100000"/>
               </a:lnSpc>
@@ -862,7 +857,7 @@
             </a:endParaRPr>
           </a:p>
           <a:p>
-            <a:pPr>
+            <a:pPr marL="216000" indent="-216000">
               <a:lnSpc>
                 <a:spcPct val="100000"/>
               </a:lnSpc>
@@ -872,7 +867,7 @@
             </a:endParaRPr>
           </a:p>
           <a:p>
-            <a:pPr>
+            <a:pPr marL="216000" indent="-216000">
               <a:lnSpc>
                 <a:spcPct val="100000"/>
               </a:lnSpc>
@@ -917,7 +912,7 @@
       </p:grpSpPr>
       <p:sp>
         <p:nvSpPr>
-          <p:cNvPr id="68" name="PlaceHolder 1"/>
+          <p:cNvPr id="66" name="PlaceHolder 1"/>
           <p:cNvSpPr>
             <a:spLocks noGrp="1"/>
           </p:cNvSpPr>
@@ -928,16 +923,16 @@
         <p:spPr>
           <a:xfrm>
             <a:off x="380880" y="685800"/>
-            <a:ext cx="6095520" cy="3428640"/>
-          </a:xfrm>
-          <a:prstGeom prst="rect">
-            <a:avLst/>
-          </a:prstGeom>
-        </p:spPr>
-      </p:sp>
-      <p:sp>
-        <p:nvSpPr>
-          <p:cNvPr id="69" name="PlaceHolder 2"/>
+            <a:ext cx="6095160" cy="3428280"/>
+          </a:xfrm>
+          <a:prstGeom prst="rect">
+            <a:avLst/>
+          </a:prstGeom>
+        </p:spPr>
+      </p:sp>
+      <p:sp>
+        <p:nvSpPr>
+          <p:cNvPr id="67" name="PlaceHolder 2"/>
           <p:cNvSpPr>
             <a:spLocks noGrp="1"/>
           </p:cNvSpPr>
@@ -948,16 +943,16 @@
         <p:spPr>
           <a:xfrm>
             <a:off x="685800" y="4343400"/>
-            <a:ext cx="5486040" cy="4114440"/>
-          </a:xfrm>
-          <a:prstGeom prst="rect">
-            <a:avLst/>
-          </a:prstGeom>
-        </p:spPr>
-        <p:txBody>
-          <a:bodyPr tIns="91440" bIns="91440"/>
-          <a:p>
-            <a:pPr>
+            <a:ext cx="5485680" cy="4114080"/>
+          </a:xfrm>
+          <a:prstGeom prst="rect">
+            <a:avLst/>
+          </a:prstGeom>
+        </p:spPr>
+        <p:txBody>
+          <a:bodyPr lIns="0" rIns="0" tIns="91440" bIns="91440"/>
+          <a:p>
+            <a:pPr marL="216000" indent="-216000">
               <a:lnSpc>
                 <a:spcPct val="100000"/>
               </a:lnSpc>
@@ -967,7 +962,7 @@
             </a:endParaRPr>
           </a:p>
           <a:p>
-            <a:pPr>
+            <a:pPr marL="216000" indent="-216000">
               <a:lnSpc>
                 <a:spcPct val="100000"/>
               </a:lnSpc>
@@ -987,7 +982,7 @@
             </a:endParaRPr>
           </a:p>
           <a:p>
-            <a:pPr>
+            <a:pPr marL="216000" indent="-216000">
               <a:lnSpc>
                 <a:spcPct val="100000"/>
               </a:lnSpc>
@@ -1017,7 +1012,7 @@
             </a:endParaRPr>
           </a:p>
           <a:p>
-            <a:pPr>
+            <a:pPr marL="216000" indent="-216000">
               <a:lnSpc>
                 <a:spcPct val="100000"/>
               </a:lnSpc>
@@ -1037,7 +1032,7 @@
             </a:endParaRPr>
           </a:p>
           <a:p>
-            <a:pPr>
+            <a:pPr marL="216000" indent="-216000">
               <a:lnSpc>
                 <a:spcPct val="100000"/>
               </a:lnSpc>
@@ -1057,7 +1052,7 @@
             </a:endParaRPr>
           </a:p>
           <a:p>
-            <a:pPr>
+            <a:pPr marL="216000" indent="-216000">
               <a:lnSpc>
                 <a:spcPct val="100000"/>
               </a:lnSpc>
@@ -1077,7 +1072,7 @@
             </a:endParaRPr>
           </a:p>
           <a:p>
-            <a:pPr>
+            <a:pPr marL="216000" indent="-216000">
               <a:lnSpc>
                 <a:spcPct val="100000"/>
               </a:lnSpc>
@@ -1087,7 +1082,7 @@
             </a:endParaRPr>
           </a:p>
           <a:p>
-            <a:pPr>
+            <a:pPr marL="216000" indent="-216000">
               <a:lnSpc>
                 <a:spcPct val="100000"/>
               </a:lnSpc>
@@ -1154,7 +1149,7 @@
       </p:grpSpPr>
       <p:sp>
         <p:nvSpPr>
-          <p:cNvPr id="25" name="PlaceHolder 1"/>
+          <p:cNvPr id="24" name="PlaceHolder 1"/>
           <p:cNvSpPr>
             <a:spLocks noGrp="1"/>
           </p:cNvSpPr>
@@ -1164,8 +1159,8 @@
         </p:nvSpPr>
         <p:spPr>
           <a:xfrm>
-            <a:off x="311760" y="444960"/>
-            <a:ext cx="8520120" cy="572400"/>
+            <a:off x="311760" y="418320"/>
+            <a:ext cx="8519760" cy="625320"/>
           </a:xfrm>
           <a:prstGeom prst="rect">
             <a:avLst/>
@@ -1174,18 +1169,16 @@
         <p:txBody>
           <a:bodyPr lIns="0" rIns="0" tIns="0" bIns="0" anchor="ctr"/>
           <a:p>
-            <a:endParaRPr b="0" lang="en-US" sz="1400" spc="-1" strike="noStrike">
-              <a:solidFill>
-                <a:srgbClr val="000000"/>
-              </a:solidFill>
-              <a:latin typeface="Arial"/>
-            </a:endParaRPr>
-          </a:p>
-        </p:txBody>
-      </p:sp>
-      <p:sp>
-        <p:nvSpPr>
-          <p:cNvPr id="26" name="PlaceHolder 2"/>
+            <a:pPr algn="ctr"/>
+            <a:endParaRPr b="0" lang="en-US" sz="4400" spc="-1" strike="noStrike">
+              <a:latin typeface="Arial"/>
+            </a:endParaRPr>
+          </a:p>
+        </p:txBody>
+      </p:sp>
+      <p:sp>
+        <p:nvSpPr>
+          <p:cNvPr id="25" name="PlaceHolder 2"/>
           <p:cNvSpPr>
             <a:spLocks noGrp="1"/>
           </p:cNvSpPr>
@@ -1196,7 +1189,7 @@
         <p:spPr>
           <a:xfrm>
             <a:off x="311760" y="1152360"/>
-            <a:ext cx="3999600" cy="1629360"/>
+            <a:ext cx="1951200" cy="1629000"/>
           </a:xfrm>
           <a:prstGeom prst="rect">
             <a:avLst/>
@@ -1207,18 +1200,15 @@
             <a:normAutofit/>
           </a:bodyPr>
           <a:p>
-            <a:endParaRPr b="0" lang="en-US" sz="1400" spc="-1" strike="noStrike">
-              <a:solidFill>
-                <a:srgbClr val="000000"/>
-              </a:solidFill>
-              <a:latin typeface="Arial"/>
-            </a:endParaRPr>
-          </a:p>
-        </p:txBody>
-      </p:sp>
-      <p:sp>
-        <p:nvSpPr>
-          <p:cNvPr id="27" name="PlaceHolder 3"/>
+            <a:endParaRPr b="0" lang="en-US" sz="3200" spc="-1" strike="noStrike">
+              <a:latin typeface="Arial"/>
+            </a:endParaRPr>
+          </a:p>
+        </p:txBody>
+      </p:sp>
+      <p:sp>
+        <p:nvSpPr>
+          <p:cNvPr id="26" name="PlaceHolder 3"/>
           <p:cNvSpPr>
             <a:spLocks noGrp="1"/>
           </p:cNvSpPr>
@@ -1228,8 +1218,8 @@
         </p:nvSpPr>
         <p:spPr>
           <a:xfrm>
-            <a:off x="311760" y="2936880"/>
-            <a:ext cx="3999600" cy="1629360"/>
+            <a:off x="311760" y="2936520"/>
+            <a:ext cx="1951200" cy="1629000"/>
           </a:xfrm>
           <a:prstGeom prst="rect">
             <a:avLst/>
@@ -1240,10 +1230,7 @@
             <a:normAutofit/>
           </a:bodyPr>
           <a:p>
-            <a:endParaRPr b="0" lang="en-US" sz="1400" spc="-1" strike="noStrike">
-              <a:solidFill>
-                <a:srgbClr val="000000"/>
-              </a:solidFill>
+            <a:endParaRPr b="0" lang="en-US" sz="3200" spc="-1" strike="noStrike">
               <a:latin typeface="Arial"/>
             </a:endParaRPr>
           </a:p>
@@ -1273,7 +1260,7 @@
       </p:grpSpPr>
       <p:sp>
         <p:nvSpPr>
-          <p:cNvPr id="28" name="PlaceHolder 1"/>
+          <p:cNvPr id="27" name="PlaceHolder 1"/>
           <p:cNvSpPr>
             <a:spLocks noGrp="1"/>
           </p:cNvSpPr>
@@ -1283,8 +1270,8 @@
         </p:nvSpPr>
         <p:spPr>
           <a:xfrm>
-            <a:off x="311760" y="444960"/>
-            <a:ext cx="8520120" cy="572400"/>
+            <a:off x="311760" y="418320"/>
+            <a:ext cx="8519760" cy="625320"/>
           </a:xfrm>
           <a:prstGeom prst="rect">
             <a:avLst/>
@@ -1293,18 +1280,16 @@
         <p:txBody>
           <a:bodyPr lIns="0" rIns="0" tIns="0" bIns="0" anchor="ctr"/>
           <a:p>
-            <a:endParaRPr b="0" lang="en-US" sz="1400" spc="-1" strike="noStrike">
-              <a:solidFill>
-                <a:srgbClr val="000000"/>
-              </a:solidFill>
-              <a:latin typeface="Arial"/>
-            </a:endParaRPr>
-          </a:p>
-        </p:txBody>
-      </p:sp>
-      <p:sp>
-        <p:nvSpPr>
-          <p:cNvPr id="29" name="PlaceHolder 2"/>
+            <a:pPr algn="ctr"/>
+            <a:endParaRPr b="0" lang="en-US" sz="4400" spc="-1" strike="noStrike">
+              <a:latin typeface="Arial"/>
+            </a:endParaRPr>
+          </a:p>
+        </p:txBody>
+      </p:sp>
+      <p:sp>
+        <p:nvSpPr>
+          <p:cNvPr id="28" name="PlaceHolder 2"/>
           <p:cNvSpPr>
             <a:spLocks noGrp="1"/>
           </p:cNvSpPr>
@@ -1315,7 +1300,7 @@
         <p:spPr>
           <a:xfrm>
             <a:off x="311760" y="1152360"/>
-            <a:ext cx="1951560" cy="1629360"/>
+            <a:ext cx="951840" cy="1629000"/>
           </a:xfrm>
           <a:prstGeom prst="rect">
             <a:avLst/>
@@ -1326,18 +1311,15 @@
             <a:normAutofit/>
           </a:bodyPr>
           <a:p>
-            <a:endParaRPr b="0" lang="en-US" sz="1400" spc="-1" strike="noStrike">
-              <a:solidFill>
-                <a:srgbClr val="000000"/>
-              </a:solidFill>
-              <a:latin typeface="Arial"/>
-            </a:endParaRPr>
-          </a:p>
-        </p:txBody>
-      </p:sp>
-      <p:sp>
-        <p:nvSpPr>
-          <p:cNvPr id="30" name="PlaceHolder 3"/>
+            <a:endParaRPr b="0" lang="en-US" sz="3200" spc="-1" strike="noStrike">
+              <a:latin typeface="Arial"/>
+            </a:endParaRPr>
+          </a:p>
+        </p:txBody>
+      </p:sp>
+      <p:sp>
+        <p:nvSpPr>
+          <p:cNvPr id="29" name="PlaceHolder 3"/>
           <p:cNvSpPr>
             <a:spLocks noGrp="1"/>
           </p:cNvSpPr>
@@ -1347,8 +1329,8 @@
         </p:nvSpPr>
         <p:spPr>
           <a:xfrm>
-            <a:off x="2361240" y="1152360"/>
-            <a:ext cx="1951560" cy="1629360"/>
+            <a:off x="1311480" y="1152360"/>
+            <a:ext cx="951840" cy="1629000"/>
           </a:xfrm>
           <a:prstGeom prst="rect">
             <a:avLst/>
@@ -1359,18 +1341,15 @@
             <a:normAutofit/>
           </a:bodyPr>
           <a:p>
-            <a:endParaRPr b="0" lang="en-US" sz="1400" spc="-1" strike="noStrike">
-              <a:solidFill>
-                <a:srgbClr val="000000"/>
-              </a:solidFill>
-              <a:latin typeface="Arial"/>
-            </a:endParaRPr>
-          </a:p>
-        </p:txBody>
-      </p:sp>
-      <p:sp>
-        <p:nvSpPr>
-          <p:cNvPr id="31" name="PlaceHolder 4"/>
+            <a:endParaRPr b="0" lang="en-US" sz="3200" spc="-1" strike="noStrike">
+              <a:latin typeface="Arial"/>
+            </a:endParaRPr>
+          </a:p>
+        </p:txBody>
+      </p:sp>
+      <p:sp>
+        <p:nvSpPr>
+          <p:cNvPr id="30" name="PlaceHolder 4"/>
           <p:cNvSpPr>
             <a:spLocks noGrp="1"/>
           </p:cNvSpPr>
@@ -1380,8 +1359,8 @@
         </p:nvSpPr>
         <p:spPr>
           <a:xfrm>
-            <a:off x="311760" y="2936880"/>
-            <a:ext cx="1951560" cy="1629360"/>
+            <a:off x="311760" y="2936520"/>
+            <a:ext cx="951840" cy="1629000"/>
           </a:xfrm>
           <a:prstGeom prst="rect">
             <a:avLst/>
@@ -1392,18 +1371,15 @@
             <a:normAutofit/>
           </a:bodyPr>
           <a:p>
-            <a:endParaRPr b="0" lang="en-US" sz="1400" spc="-1" strike="noStrike">
-              <a:solidFill>
-                <a:srgbClr val="000000"/>
-              </a:solidFill>
-              <a:latin typeface="Arial"/>
-            </a:endParaRPr>
-          </a:p>
-        </p:txBody>
-      </p:sp>
-      <p:sp>
-        <p:nvSpPr>
-          <p:cNvPr id="32" name="PlaceHolder 5"/>
+            <a:endParaRPr b="0" lang="en-US" sz="3200" spc="-1" strike="noStrike">
+              <a:latin typeface="Arial"/>
+            </a:endParaRPr>
+          </a:p>
+        </p:txBody>
+      </p:sp>
+      <p:sp>
+        <p:nvSpPr>
+          <p:cNvPr id="31" name="PlaceHolder 5"/>
           <p:cNvSpPr>
             <a:spLocks noGrp="1"/>
           </p:cNvSpPr>
@@ -1413,8 +1389,8 @@
         </p:nvSpPr>
         <p:spPr>
           <a:xfrm>
-            <a:off x="2361240" y="2936880"/>
-            <a:ext cx="1951560" cy="1629360"/>
+            <a:off x="1311480" y="2936520"/>
+            <a:ext cx="951840" cy="1629000"/>
           </a:xfrm>
           <a:prstGeom prst="rect">
             <a:avLst/>
@@ -1425,10 +1401,7 @@
             <a:normAutofit/>
           </a:bodyPr>
           <a:p>
-            <a:endParaRPr b="0" lang="en-US" sz="1400" spc="-1" strike="noStrike">
-              <a:solidFill>
-                <a:srgbClr val="000000"/>
-              </a:solidFill>
+            <a:endParaRPr b="0" lang="en-US" sz="3200" spc="-1" strike="noStrike">
               <a:latin typeface="Arial"/>
             </a:endParaRPr>
           </a:p>
@@ -1458,7 +1431,7 @@
       </p:grpSpPr>
       <p:sp>
         <p:nvSpPr>
-          <p:cNvPr id="33" name="PlaceHolder 1"/>
+          <p:cNvPr id="32" name="PlaceHolder 1"/>
           <p:cNvSpPr>
             <a:spLocks noGrp="1"/>
           </p:cNvSpPr>
@@ -1468,8 +1441,8 @@
         </p:nvSpPr>
         <p:spPr>
           <a:xfrm>
-            <a:off x="311760" y="444960"/>
-            <a:ext cx="8520120" cy="572400"/>
+            <a:off x="311760" y="418320"/>
+            <a:ext cx="8519760" cy="625320"/>
           </a:xfrm>
           <a:prstGeom prst="rect">
             <a:avLst/>
@@ -1478,18 +1451,16 @@
         <p:txBody>
           <a:bodyPr lIns="0" rIns="0" tIns="0" bIns="0" anchor="ctr"/>
           <a:p>
-            <a:endParaRPr b="0" lang="en-US" sz="1400" spc="-1" strike="noStrike">
-              <a:solidFill>
-                <a:srgbClr val="000000"/>
-              </a:solidFill>
-              <a:latin typeface="Arial"/>
-            </a:endParaRPr>
-          </a:p>
-        </p:txBody>
-      </p:sp>
-      <p:sp>
-        <p:nvSpPr>
-          <p:cNvPr id="34" name="PlaceHolder 2"/>
+            <a:pPr algn="ctr"/>
+            <a:endParaRPr b="0" lang="en-US" sz="4400" spc="-1" strike="noStrike">
+              <a:latin typeface="Arial"/>
+            </a:endParaRPr>
+          </a:p>
+        </p:txBody>
+      </p:sp>
+      <p:sp>
+        <p:nvSpPr>
+          <p:cNvPr id="33" name="PlaceHolder 2"/>
           <p:cNvSpPr>
             <a:spLocks noGrp="1"/>
           </p:cNvSpPr>
@@ -1500,7 +1471,7 @@
         <p:spPr>
           <a:xfrm>
             <a:off x="311760" y="1152360"/>
-            <a:ext cx="1287720" cy="1629360"/>
+            <a:ext cx="628200" cy="1629000"/>
           </a:xfrm>
           <a:prstGeom prst="rect">
             <a:avLst/>
@@ -1511,18 +1482,15 @@
             <a:normAutofit/>
           </a:bodyPr>
           <a:p>
-            <a:endParaRPr b="0" lang="en-US" sz="1400" spc="-1" strike="noStrike">
-              <a:solidFill>
-                <a:srgbClr val="000000"/>
-              </a:solidFill>
-              <a:latin typeface="Arial"/>
-            </a:endParaRPr>
-          </a:p>
-        </p:txBody>
-      </p:sp>
-      <p:sp>
-        <p:nvSpPr>
-          <p:cNvPr id="35" name="PlaceHolder 3"/>
+            <a:endParaRPr b="0" lang="en-US" sz="3200" spc="-1" strike="noStrike">
+              <a:latin typeface="Arial"/>
+            </a:endParaRPr>
+          </a:p>
+        </p:txBody>
+      </p:sp>
+      <p:sp>
+        <p:nvSpPr>
+          <p:cNvPr id="34" name="PlaceHolder 3"/>
           <p:cNvSpPr>
             <a:spLocks noGrp="1"/>
           </p:cNvSpPr>
@@ -1532,8 +1500,8 @@
         </p:nvSpPr>
         <p:spPr>
           <a:xfrm>
-            <a:off x="1664280" y="1152360"/>
-            <a:ext cx="1287720" cy="1629360"/>
+            <a:off x="971640" y="1152360"/>
+            <a:ext cx="628200" cy="1629000"/>
           </a:xfrm>
           <a:prstGeom prst="rect">
             <a:avLst/>
@@ -1544,18 +1512,15 @@
             <a:normAutofit/>
           </a:bodyPr>
           <a:p>
-            <a:endParaRPr b="0" lang="en-US" sz="1400" spc="-1" strike="noStrike">
-              <a:solidFill>
-                <a:srgbClr val="000000"/>
-              </a:solidFill>
-              <a:latin typeface="Arial"/>
-            </a:endParaRPr>
-          </a:p>
-        </p:txBody>
-      </p:sp>
-      <p:sp>
-        <p:nvSpPr>
-          <p:cNvPr id="36" name="PlaceHolder 4"/>
+            <a:endParaRPr b="0" lang="en-US" sz="3200" spc="-1" strike="noStrike">
+              <a:latin typeface="Arial"/>
+            </a:endParaRPr>
+          </a:p>
+        </p:txBody>
+      </p:sp>
+      <p:sp>
+        <p:nvSpPr>
+          <p:cNvPr id="35" name="PlaceHolder 4"/>
           <p:cNvSpPr>
             <a:spLocks noGrp="1"/>
           </p:cNvSpPr>
@@ -1565,8 +1530,8 @@
         </p:nvSpPr>
         <p:spPr>
           <a:xfrm>
-            <a:off x="3016800" y="1152360"/>
-            <a:ext cx="1287720" cy="1629360"/>
+            <a:off x="1631880" y="1152360"/>
+            <a:ext cx="628200" cy="1629000"/>
           </a:xfrm>
           <a:prstGeom prst="rect">
             <a:avLst/>
@@ -1577,18 +1542,15 @@
             <a:normAutofit/>
           </a:bodyPr>
           <a:p>
-            <a:endParaRPr b="0" lang="en-US" sz="1400" spc="-1" strike="noStrike">
-              <a:solidFill>
-                <a:srgbClr val="000000"/>
-              </a:solidFill>
-              <a:latin typeface="Arial"/>
-            </a:endParaRPr>
-          </a:p>
-        </p:txBody>
-      </p:sp>
-      <p:sp>
-        <p:nvSpPr>
-          <p:cNvPr id="37" name="PlaceHolder 5"/>
+            <a:endParaRPr b="0" lang="en-US" sz="3200" spc="-1" strike="noStrike">
+              <a:latin typeface="Arial"/>
+            </a:endParaRPr>
+          </a:p>
+        </p:txBody>
+      </p:sp>
+      <p:sp>
+        <p:nvSpPr>
+          <p:cNvPr id="36" name="PlaceHolder 5"/>
           <p:cNvSpPr>
             <a:spLocks noGrp="1"/>
           </p:cNvSpPr>
@@ -1598,8 +1560,8 @@
         </p:nvSpPr>
         <p:spPr>
           <a:xfrm>
-            <a:off x="311760" y="2936880"/>
-            <a:ext cx="1287720" cy="1629360"/>
+            <a:off x="311760" y="2936520"/>
+            <a:ext cx="628200" cy="1629000"/>
           </a:xfrm>
           <a:prstGeom prst="rect">
             <a:avLst/>
@@ -1610,18 +1572,15 @@
             <a:normAutofit/>
           </a:bodyPr>
           <a:p>
-            <a:endParaRPr b="0" lang="en-US" sz="1400" spc="-1" strike="noStrike">
-              <a:solidFill>
-                <a:srgbClr val="000000"/>
-              </a:solidFill>
-              <a:latin typeface="Arial"/>
-            </a:endParaRPr>
-          </a:p>
-        </p:txBody>
-      </p:sp>
-      <p:sp>
-        <p:nvSpPr>
-          <p:cNvPr id="38" name="PlaceHolder 6"/>
+            <a:endParaRPr b="0" lang="en-US" sz="3200" spc="-1" strike="noStrike">
+              <a:latin typeface="Arial"/>
+            </a:endParaRPr>
+          </a:p>
+        </p:txBody>
+      </p:sp>
+      <p:sp>
+        <p:nvSpPr>
+          <p:cNvPr id="37" name="PlaceHolder 6"/>
           <p:cNvSpPr>
             <a:spLocks noGrp="1"/>
           </p:cNvSpPr>
@@ -1631,8 +1590,8 @@
         </p:nvSpPr>
         <p:spPr>
           <a:xfrm>
-            <a:off x="1664280" y="2936880"/>
-            <a:ext cx="1287720" cy="1629360"/>
+            <a:off x="971640" y="2936520"/>
+            <a:ext cx="628200" cy="1629000"/>
           </a:xfrm>
           <a:prstGeom prst="rect">
             <a:avLst/>
@@ -1643,18 +1602,15 @@
             <a:normAutofit/>
           </a:bodyPr>
           <a:p>
-            <a:endParaRPr b="0" lang="en-US" sz="1400" spc="-1" strike="noStrike">
-              <a:solidFill>
-                <a:srgbClr val="000000"/>
-              </a:solidFill>
-              <a:latin typeface="Arial"/>
-            </a:endParaRPr>
-          </a:p>
-        </p:txBody>
-      </p:sp>
-      <p:sp>
-        <p:nvSpPr>
-          <p:cNvPr id="39" name="PlaceHolder 7"/>
+            <a:endParaRPr b="0" lang="en-US" sz="3200" spc="-1" strike="noStrike">
+              <a:latin typeface="Arial"/>
+            </a:endParaRPr>
+          </a:p>
+        </p:txBody>
+      </p:sp>
+      <p:sp>
+        <p:nvSpPr>
+          <p:cNvPr id="38" name="PlaceHolder 7"/>
           <p:cNvSpPr>
             <a:spLocks noGrp="1"/>
           </p:cNvSpPr>
@@ -1664,8 +1620,8 @@
         </p:nvSpPr>
         <p:spPr>
           <a:xfrm>
-            <a:off x="3016800" y="2936880"/>
-            <a:ext cx="1287720" cy="1629360"/>
+            <a:off x="1631880" y="2936520"/>
+            <a:ext cx="628200" cy="1629000"/>
           </a:xfrm>
           <a:prstGeom prst="rect">
             <a:avLst/>
@@ -1676,10 +1632,7 @@
             <a:normAutofit/>
           </a:bodyPr>
           <a:p>
-            <a:endParaRPr b="0" lang="en-US" sz="1400" spc="-1" strike="noStrike">
-              <a:solidFill>
-                <a:srgbClr val="000000"/>
-              </a:solidFill>
+            <a:endParaRPr b="0" lang="en-US" sz="3200" spc="-1" strike="noStrike">
               <a:latin typeface="Arial"/>
             </a:endParaRPr>
           </a:p>
@@ -1709,7 +1662,7 @@
       </p:grpSpPr>
       <p:sp>
         <p:nvSpPr>
-          <p:cNvPr id="4" name="PlaceHolder 1"/>
+          <p:cNvPr id="3" name="PlaceHolder 1"/>
           <p:cNvSpPr>
             <a:spLocks noGrp="1"/>
           </p:cNvSpPr>
@@ -1719,8 +1672,8 @@
         </p:nvSpPr>
         <p:spPr>
           <a:xfrm>
-            <a:off x="311760" y="444960"/>
-            <a:ext cx="8520120" cy="572400"/>
+            <a:off x="311760" y="418320"/>
+            <a:ext cx="8519760" cy="625320"/>
           </a:xfrm>
           <a:prstGeom prst="rect">
             <a:avLst/>
@@ -1729,18 +1682,16 @@
         <p:txBody>
           <a:bodyPr lIns="0" rIns="0" tIns="0" bIns="0" anchor="ctr"/>
           <a:p>
-            <a:endParaRPr b="0" lang="en-US" sz="1400" spc="-1" strike="noStrike">
-              <a:solidFill>
-                <a:srgbClr val="000000"/>
-              </a:solidFill>
-              <a:latin typeface="Arial"/>
-            </a:endParaRPr>
-          </a:p>
-        </p:txBody>
-      </p:sp>
-      <p:sp>
-        <p:nvSpPr>
-          <p:cNvPr id="5" name="PlaceHolder 2"/>
+            <a:pPr algn="ctr"/>
+            <a:endParaRPr b="0" lang="en-US" sz="4400" spc="-1" strike="noStrike">
+              <a:latin typeface="Arial"/>
+            </a:endParaRPr>
+          </a:p>
+        </p:txBody>
+      </p:sp>
+      <p:sp>
+        <p:nvSpPr>
+          <p:cNvPr id="4" name="PlaceHolder 2"/>
           <p:cNvSpPr>
             <a:spLocks noGrp="1"/>
           </p:cNvSpPr>
@@ -1751,7 +1702,7 @@
         <p:spPr>
           <a:xfrm>
             <a:off x="311760" y="1152360"/>
-            <a:ext cx="3999600" cy="3416040"/>
+            <a:ext cx="1951200" cy="3415680"/>
           </a:xfrm>
           <a:prstGeom prst="rect">
             <a:avLst/>
@@ -1791,7 +1742,7 @@
       </p:grpSpPr>
       <p:sp>
         <p:nvSpPr>
-          <p:cNvPr id="6" name="PlaceHolder 1"/>
+          <p:cNvPr id="5" name="PlaceHolder 1"/>
           <p:cNvSpPr>
             <a:spLocks noGrp="1"/>
           </p:cNvSpPr>
@@ -1801,8 +1752,8 @@
         </p:nvSpPr>
         <p:spPr>
           <a:xfrm>
-            <a:off x="311760" y="444960"/>
-            <a:ext cx="8520120" cy="572400"/>
+            <a:off x="311760" y="418320"/>
+            <a:ext cx="8519760" cy="625320"/>
           </a:xfrm>
           <a:prstGeom prst="rect">
             <a:avLst/>
@@ -1811,18 +1762,16 @@
         <p:txBody>
           <a:bodyPr lIns="0" rIns="0" tIns="0" bIns="0" anchor="ctr"/>
           <a:p>
-            <a:endParaRPr b="0" lang="en-US" sz="1400" spc="-1" strike="noStrike">
-              <a:solidFill>
-                <a:srgbClr val="000000"/>
-              </a:solidFill>
-              <a:latin typeface="Arial"/>
-            </a:endParaRPr>
-          </a:p>
-        </p:txBody>
-      </p:sp>
-      <p:sp>
-        <p:nvSpPr>
-          <p:cNvPr id="7" name="PlaceHolder 2"/>
+            <a:pPr algn="ctr"/>
+            <a:endParaRPr b="0" lang="en-US" sz="4400" spc="-1" strike="noStrike">
+              <a:latin typeface="Arial"/>
+            </a:endParaRPr>
+          </a:p>
+        </p:txBody>
+      </p:sp>
+      <p:sp>
+        <p:nvSpPr>
+          <p:cNvPr id="6" name="PlaceHolder 2"/>
           <p:cNvSpPr>
             <a:spLocks noGrp="1"/>
           </p:cNvSpPr>
@@ -1833,7 +1782,7 @@
         <p:spPr>
           <a:xfrm>
             <a:off x="311760" y="1152360"/>
-            <a:ext cx="3999600" cy="3416040"/>
+            <a:ext cx="1951200" cy="3415680"/>
           </a:xfrm>
           <a:prstGeom prst="rect">
             <a:avLst/>
@@ -1844,10 +1793,7 @@
             <a:normAutofit/>
           </a:bodyPr>
           <a:p>
-            <a:endParaRPr b="0" lang="en-US" sz="1400" spc="-1" strike="noStrike">
-              <a:solidFill>
-                <a:srgbClr val="000000"/>
-              </a:solidFill>
+            <a:endParaRPr b="0" lang="en-US" sz="3200" spc="-1" strike="noStrike">
               <a:latin typeface="Arial"/>
             </a:endParaRPr>
           </a:p>
@@ -1877,7 +1823,7 @@
       </p:grpSpPr>
       <p:sp>
         <p:nvSpPr>
-          <p:cNvPr id="8" name="PlaceHolder 1"/>
+          <p:cNvPr id="7" name="PlaceHolder 1"/>
           <p:cNvSpPr>
             <a:spLocks noGrp="1"/>
           </p:cNvSpPr>
@@ -1887,8 +1833,8 @@
         </p:nvSpPr>
         <p:spPr>
           <a:xfrm>
-            <a:off x="311760" y="444960"/>
-            <a:ext cx="8520120" cy="572400"/>
+            <a:off x="311760" y="418320"/>
+            <a:ext cx="8519760" cy="625320"/>
           </a:xfrm>
           <a:prstGeom prst="rect">
             <a:avLst/>
@@ -1897,18 +1843,16 @@
         <p:txBody>
           <a:bodyPr lIns="0" rIns="0" tIns="0" bIns="0" anchor="ctr"/>
           <a:p>
-            <a:endParaRPr b="0" lang="en-US" sz="1400" spc="-1" strike="noStrike">
-              <a:solidFill>
-                <a:srgbClr val="000000"/>
-              </a:solidFill>
-              <a:latin typeface="Arial"/>
-            </a:endParaRPr>
-          </a:p>
-        </p:txBody>
-      </p:sp>
-      <p:sp>
-        <p:nvSpPr>
-          <p:cNvPr id="9" name="PlaceHolder 2"/>
+            <a:pPr algn="ctr"/>
+            <a:endParaRPr b="0" lang="en-US" sz="4400" spc="-1" strike="noStrike">
+              <a:latin typeface="Arial"/>
+            </a:endParaRPr>
+          </a:p>
+        </p:txBody>
+      </p:sp>
+      <p:sp>
+        <p:nvSpPr>
+          <p:cNvPr id="8" name="PlaceHolder 2"/>
           <p:cNvSpPr>
             <a:spLocks noGrp="1"/>
           </p:cNvSpPr>
@@ -1919,7 +1863,7 @@
         <p:spPr>
           <a:xfrm>
             <a:off x="311760" y="1152360"/>
-            <a:ext cx="1951560" cy="3416040"/>
+            <a:ext cx="951840" cy="3415680"/>
           </a:xfrm>
           <a:prstGeom prst="rect">
             <a:avLst/>
@@ -1930,18 +1874,15 @@
             <a:normAutofit/>
           </a:bodyPr>
           <a:p>
-            <a:endParaRPr b="0" lang="en-US" sz="1400" spc="-1" strike="noStrike">
-              <a:solidFill>
-                <a:srgbClr val="000000"/>
-              </a:solidFill>
-              <a:latin typeface="Arial"/>
-            </a:endParaRPr>
-          </a:p>
-        </p:txBody>
-      </p:sp>
-      <p:sp>
-        <p:nvSpPr>
-          <p:cNvPr id="10" name="PlaceHolder 3"/>
+            <a:endParaRPr b="0" lang="en-US" sz="3200" spc="-1" strike="noStrike">
+              <a:latin typeface="Arial"/>
+            </a:endParaRPr>
+          </a:p>
+        </p:txBody>
+      </p:sp>
+      <p:sp>
+        <p:nvSpPr>
+          <p:cNvPr id="9" name="PlaceHolder 3"/>
           <p:cNvSpPr>
             <a:spLocks noGrp="1"/>
           </p:cNvSpPr>
@@ -1951,8 +1892,8 @@
         </p:nvSpPr>
         <p:spPr>
           <a:xfrm>
-            <a:off x="2361240" y="1152360"/>
-            <a:ext cx="1951560" cy="3416040"/>
+            <a:off x="1311480" y="1152360"/>
+            <a:ext cx="951840" cy="3415680"/>
           </a:xfrm>
           <a:prstGeom prst="rect">
             <a:avLst/>
@@ -1963,10 +1904,7 @@
             <a:normAutofit/>
           </a:bodyPr>
           <a:p>
-            <a:endParaRPr b="0" lang="en-US" sz="1400" spc="-1" strike="noStrike">
-              <a:solidFill>
-                <a:srgbClr val="000000"/>
-              </a:solidFill>
+            <a:endParaRPr b="0" lang="en-US" sz="3200" spc="-1" strike="noStrike">
               <a:latin typeface="Arial"/>
             </a:endParaRPr>
           </a:p>
@@ -1996,7 +1934,7 @@
       </p:grpSpPr>
       <p:sp>
         <p:nvSpPr>
-          <p:cNvPr id="11" name="PlaceHolder 1"/>
+          <p:cNvPr id="10" name="PlaceHolder 1"/>
           <p:cNvSpPr>
             <a:spLocks noGrp="1"/>
           </p:cNvSpPr>
@@ -2006,8 +1944,8 @@
         </p:nvSpPr>
         <p:spPr>
           <a:xfrm>
-            <a:off x="311760" y="444960"/>
-            <a:ext cx="8520120" cy="572400"/>
+            <a:off x="311760" y="418320"/>
+            <a:ext cx="8519760" cy="625320"/>
           </a:xfrm>
           <a:prstGeom prst="rect">
             <a:avLst/>
@@ -2016,10 +1954,8 @@
         <p:txBody>
           <a:bodyPr lIns="0" rIns="0" tIns="0" bIns="0" anchor="ctr"/>
           <a:p>
-            <a:endParaRPr b="0" lang="en-US" sz="1400" spc="-1" strike="noStrike">
-              <a:solidFill>
-                <a:srgbClr val="000000"/>
-              </a:solidFill>
+            <a:pPr algn="ctr"/>
+            <a:endParaRPr b="0" lang="en-US" sz="4400" spc="-1" strike="noStrike">
               <a:latin typeface="Arial"/>
             </a:endParaRPr>
           </a:p>
@@ -2049,7 +1985,7 @@
       </p:grpSpPr>
       <p:sp>
         <p:nvSpPr>
-          <p:cNvPr id="12" name="PlaceHolder 1"/>
+          <p:cNvPr id="11" name="PlaceHolder 1"/>
           <p:cNvSpPr>
             <a:spLocks noGrp="1"/>
           </p:cNvSpPr>
@@ -2060,7 +1996,7 @@
         <p:spPr>
           <a:xfrm>
             <a:off x="311760" y="444960"/>
-            <a:ext cx="8520120" cy="2654640"/>
+            <a:ext cx="8519760" cy="2652840"/>
           </a:xfrm>
           <a:prstGeom prst="rect">
             <a:avLst/>
@@ -2100,7 +2036,7 @@
       </p:grpSpPr>
       <p:sp>
         <p:nvSpPr>
-          <p:cNvPr id="13" name="PlaceHolder 1"/>
+          <p:cNvPr id="12" name="PlaceHolder 1"/>
           <p:cNvSpPr>
             <a:spLocks noGrp="1"/>
           </p:cNvSpPr>
@@ -2110,8 +2046,8 @@
         </p:nvSpPr>
         <p:spPr>
           <a:xfrm>
-            <a:off x="311760" y="444960"/>
-            <a:ext cx="8520120" cy="572400"/>
+            <a:off x="311760" y="418320"/>
+            <a:ext cx="8519760" cy="625320"/>
           </a:xfrm>
           <a:prstGeom prst="rect">
             <a:avLst/>
@@ -2120,18 +2056,16 @@
         <p:txBody>
           <a:bodyPr lIns="0" rIns="0" tIns="0" bIns="0" anchor="ctr"/>
           <a:p>
-            <a:endParaRPr b="0" lang="en-US" sz="1400" spc="-1" strike="noStrike">
-              <a:solidFill>
-                <a:srgbClr val="000000"/>
-              </a:solidFill>
-              <a:latin typeface="Arial"/>
-            </a:endParaRPr>
-          </a:p>
-        </p:txBody>
-      </p:sp>
-      <p:sp>
-        <p:nvSpPr>
-          <p:cNvPr id="14" name="PlaceHolder 2"/>
+            <a:pPr algn="ctr"/>
+            <a:endParaRPr b="0" lang="en-US" sz="4400" spc="-1" strike="noStrike">
+              <a:latin typeface="Arial"/>
+            </a:endParaRPr>
+          </a:p>
+        </p:txBody>
+      </p:sp>
+      <p:sp>
+        <p:nvSpPr>
+          <p:cNvPr id="13" name="PlaceHolder 2"/>
           <p:cNvSpPr>
             <a:spLocks noGrp="1"/>
           </p:cNvSpPr>
@@ -2142,7 +2076,7 @@
         <p:spPr>
           <a:xfrm>
             <a:off x="311760" y="1152360"/>
-            <a:ext cx="1951560" cy="1629360"/>
+            <a:ext cx="951840" cy="1629000"/>
           </a:xfrm>
           <a:prstGeom prst="rect">
             <a:avLst/>
@@ -2153,18 +2087,15 @@
             <a:normAutofit/>
           </a:bodyPr>
           <a:p>
-            <a:endParaRPr b="0" lang="en-US" sz="1400" spc="-1" strike="noStrike">
-              <a:solidFill>
-                <a:srgbClr val="000000"/>
-              </a:solidFill>
-              <a:latin typeface="Arial"/>
-            </a:endParaRPr>
-          </a:p>
-        </p:txBody>
-      </p:sp>
-      <p:sp>
-        <p:nvSpPr>
-          <p:cNvPr id="15" name="PlaceHolder 3"/>
+            <a:endParaRPr b="0" lang="en-US" sz="3200" spc="-1" strike="noStrike">
+              <a:latin typeface="Arial"/>
+            </a:endParaRPr>
+          </a:p>
+        </p:txBody>
+      </p:sp>
+      <p:sp>
+        <p:nvSpPr>
+          <p:cNvPr id="14" name="PlaceHolder 3"/>
           <p:cNvSpPr>
             <a:spLocks noGrp="1"/>
           </p:cNvSpPr>
@@ -2174,8 +2105,8 @@
         </p:nvSpPr>
         <p:spPr>
           <a:xfrm>
-            <a:off x="2361240" y="1152360"/>
-            <a:ext cx="1951560" cy="3416040"/>
+            <a:off x="1311480" y="1152360"/>
+            <a:ext cx="951840" cy="3415680"/>
           </a:xfrm>
           <a:prstGeom prst="rect">
             <a:avLst/>
@@ -2186,18 +2117,15 @@
             <a:normAutofit/>
           </a:bodyPr>
           <a:p>
-            <a:endParaRPr b="0" lang="en-US" sz="1400" spc="-1" strike="noStrike">
-              <a:solidFill>
-                <a:srgbClr val="000000"/>
-              </a:solidFill>
-              <a:latin typeface="Arial"/>
-            </a:endParaRPr>
-          </a:p>
-        </p:txBody>
-      </p:sp>
-      <p:sp>
-        <p:nvSpPr>
-          <p:cNvPr id="16" name="PlaceHolder 4"/>
+            <a:endParaRPr b="0" lang="en-US" sz="3200" spc="-1" strike="noStrike">
+              <a:latin typeface="Arial"/>
+            </a:endParaRPr>
+          </a:p>
+        </p:txBody>
+      </p:sp>
+      <p:sp>
+        <p:nvSpPr>
+          <p:cNvPr id="15" name="PlaceHolder 4"/>
           <p:cNvSpPr>
             <a:spLocks noGrp="1"/>
           </p:cNvSpPr>
@@ -2207,8 +2135,8 @@
         </p:nvSpPr>
         <p:spPr>
           <a:xfrm>
-            <a:off x="311760" y="2936880"/>
-            <a:ext cx="1951560" cy="1629360"/>
+            <a:off x="311760" y="2936520"/>
+            <a:ext cx="951840" cy="1629000"/>
           </a:xfrm>
           <a:prstGeom prst="rect">
             <a:avLst/>
@@ -2219,10 +2147,7 @@
             <a:normAutofit/>
           </a:bodyPr>
           <a:p>
-            <a:endParaRPr b="0" lang="en-US" sz="1400" spc="-1" strike="noStrike">
-              <a:solidFill>
-                <a:srgbClr val="000000"/>
-              </a:solidFill>
+            <a:endParaRPr b="0" lang="en-US" sz="3200" spc="-1" strike="noStrike">
               <a:latin typeface="Arial"/>
             </a:endParaRPr>
           </a:p>
@@ -2252,7 +2177,7 @@
       </p:grpSpPr>
       <p:sp>
         <p:nvSpPr>
-          <p:cNvPr id="17" name="PlaceHolder 1"/>
+          <p:cNvPr id="16" name="PlaceHolder 1"/>
           <p:cNvSpPr>
             <a:spLocks noGrp="1"/>
           </p:cNvSpPr>
@@ -2262,8 +2187,8 @@
         </p:nvSpPr>
         <p:spPr>
           <a:xfrm>
-            <a:off x="311760" y="444960"/>
-            <a:ext cx="8520120" cy="572400"/>
+            <a:off x="311760" y="418320"/>
+            <a:ext cx="8519760" cy="625320"/>
           </a:xfrm>
           <a:prstGeom prst="rect">
             <a:avLst/>
@@ -2272,18 +2197,16 @@
         <p:txBody>
           <a:bodyPr lIns="0" rIns="0" tIns="0" bIns="0" anchor="ctr"/>
           <a:p>
-            <a:endParaRPr b="0" lang="en-US" sz="1400" spc="-1" strike="noStrike">
-              <a:solidFill>
-                <a:srgbClr val="000000"/>
-              </a:solidFill>
-              <a:latin typeface="Arial"/>
-            </a:endParaRPr>
-          </a:p>
-        </p:txBody>
-      </p:sp>
-      <p:sp>
-        <p:nvSpPr>
-          <p:cNvPr id="18" name="PlaceHolder 2"/>
+            <a:pPr algn="ctr"/>
+            <a:endParaRPr b="0" lang="en-US" sz="4400" spc="-1" strike="noStrike">
+              <a:latin typeface="Arial"/>
+            </a:endParaRPr>
+          </a:p>
+        </p:txBody>
+      </p:sp>
+      <p:sp>
+        <p:nvSpPr>
+          <p:cNvPr id="17" name="PlaceHolder 2"/>
           <p:cNvSpPr>
             <a:spLocks noGrp="1"/>
           </p:cNvSpPr>
@@ -2294,7 +2217,7 @@
         <p:spPr>
           <a:xfrm>
             <a:off x="311760" y="1152360"/>
-            <a:ext cx="1951560" cy="3416040"/>
+            <a:ext cx="951840" cy="3415680"/>
           </a:xfrm>
           <a:prstGeom prst="rect">
             <a:avLst/>
@@ -2305,18 +2228,15 @@
             <a:normAutofit/>
           </a:bodyPr>
           <a:p>
-            <a:endParaRPr b="0" lang="en-US" sz="1400" spc="-1" strike="noStrike">
-              <a:solidFill>
-                <a:srgbClr val="000000"/>
-              </a:solidFill>
-              <a:latin typeface="Arial"/>
-            </a:endParaRPr>
-          </a:p>
-        </p:txBody>
-      </p:sp>
-      <p:sp>
-        <p:nvSpPr>
-          <p:cNvPr id="19" name="PlaceHolder 3"/>
+            <a:endParaRPr b="0" lang="en-US" sz="3200" spc="-1" strike="noStrike">
+              <a:latin typeface="Arial"/>
+            </a:endParaRPr>
+          </a:p>
+        </p:txBody>
+      </p:sp>
+      <p:sp>
+        <p:nvSpPr>
+          <p:cNvPr id="18" name="PlaceHolder 3"/>
           <p:cNvSpPr>
             <a:spLocks noGrp="1"/>
           </p:cNvSpPr>
@@ -2326,8 +2246,8 @@
         </p:nvSpPr>
         <p:spPr>
           <a:xfrm>
-            <a:off x="2361240" y="1152360"/>
-            <a:ext cx="1951560" cy="1629360"/>
+            <a:off x="1311480" y="1152360"/>
+            <a:ext cx="951840" cy="1629000"/>
           </a:xfrm>
           <a:prstGeom prst="rect">
             <a:avLst/>
@@ -2338,18 +2258,15 @@
             <a:normAutofit/>
           </a:bodyPr>
           <a:p>
-            <a:endParaRPr b="0" lang="en-US" sz="1400" spc="-1" strike="noStrike">
-              <a:solidFill>
-                <a:srgbClr val="000000"/>
-              </a:solidFill>
-              <a:latin typeface="Arial"/>
-            </a:endParaRPr>
-          </a:p>
-        </p:txBody>
-      </p:sp>
-      <p:sp>
-        <p:nvSpPr>
-          <p:cNvPr id="20" name="PlaceHolder 4"/>
+            <a:endParaRPr b="0" lang="en-US" sz="3200" spc="-1" strike="noStrike">
+              <a:latin typeface="Arial"/>
+            </a:endParaRPr>
+          </a:p>
+        </p:txBody>
+      </p:sp>
+      <p:sp>
+        <p:nvSpPr>
+          <p:cNvPr id="19" name="PlaceHolder 4"/>
           <p:cNvSpPr>
             <a:spLocks noGrp="1"/>
           </p:cNvSpPr>
@@ -2359,8 +2276,8 @@
         </p:nvSpPr>
         <p:spPr>
           <a:xfrm>
-            <a:off x="2361240" y="2936880"/>
-            <a:ext cx="1951560" cy="1629360"/>
+            <a:off x="1311480" y="2936520"/>
+            <a:ext cx="951840" cy="1629000"/>
           </a:xfrm>
           <a:prstGeom prst="rect">
             <a:avLst/>
@@ -2371,10 +2288,7 @@
             <a:normAutofit/>
           </a:bodyPr>
           <a:p>
-            <a:endParaRPr b="0" lang="en-US" sz="1400" spc="-1" strike="noStrike">
-              <a:solidFill>
-                <a:srgbClr val="000000"/>
-              </a:solidFill>
+            <a:endParaRPr b="0" lang="en-US" sz="3200" spc="-1" strike="noStrike">
               <a:latin typeface="Arial"/>
             </a:endParaRPr>
           </a:p>
@@ -2404,7 +2318,7 @@
       </p:grpSpPr>
       <p:sp>
         <p:nvSpPr>
-          <p:cNvPr id="21" name="PlaceHolder 1"/>
+          <p:cNvPr id="20" name="PlaceHolder 1"/>
           <p:cNvSpPr>
             <a:spLocks noGrp="1"/>
           </p:cNvSpPr>
@@ -2414,8 +2328,8 @@
         </p:nvSpPr>
         <p:spPr>
           <a:xfrm>
-            <a:off x="311760" y="444960"/>
-            <a:ext cx="8520120" cy="572400"/>
+            <a:off x="311760" y="418320"/>
+            <a:ext cx="8519760" cy="625320"/>
           </a:xfrm>
           <a:prstGeom prst="rect">
             <a:avLst/>
@@ -2424,18 +2338,16 @@
         <p:txBody>
           <a:bodyPr lIns="0" rIns="0" tIns="0" bIns="0" anchor="ctr"/>
           <a:p>
-            <a:endParaRPr b="0" lang="en-US" sz="1400" spc="-1" strike="noStrike">
-              <a:solidFill>
-                <a:srgbClr val="000000"/>
-              </a:solidFill>
-              <a:latin typeface="Arial"/>
-            </a:endParaRPr>
-          </a:p>
-        </p:txBody>
-      </p:sp>
-      <p:sp>
-        <p:nvSpPr>
-          <p:cNvPr id="22" name="PlaceHolder 2"/>
+            <a:pPr algn="ctr"/>
+            <a:endParaRPr b="0" lang="en-US" sz="4400" spc="-1" strike="noStrike">
+              <a:latin typeface="Arial"/>
+            </a:endParaRPr>
+          </a:p>
+        </p:txBody>
+      </p:sp>
+      <p:sp>
+        <p:nvSpPr>
+          <p:cNvPr id="21" name="PlaceHolder 2"/>
           <p:cNvSpPr>
             <a:spLocks noGrp="1"/>
           </p:cNvSpPr>
@@ -2446,7 +2358,7 @@
         <p:spPr>
           <a:xfrm>
             <a:off x="311760" y="1152360"/>
-            <a:ext cx="1951560" cy="1629360"/>
+            <a:ext cx="951840" cy="1629000"/>
           </a:xfrm>
           <a:prstGeom prst="rect">
             <a:avLst/>
@@ -2457,18 +2369,15 @@
             <a:normAutofit/>
           </a:bodyPr>
           <a:p>
-            <a:endParaRPr b="0" lang="en-US" sz="1400" spc="-1" strike="noStrike">
-              <a:solidFill>
-                <a:srgbClr val="000000"/>
-              </a:solidFill>
-              <a:latin typeface="Arial"/>
-            </a:endParaRPr>
-          </a:p>
-        </p:txBody>
-      </p:sp>
-      <p:sp>
-        <p:nvSpPr>
-          <p:cNvPr id="23" name="PlaceHolder 3"/>
+            <a:endParaRPr b="0" lang="en-US" sz="3200" spc="-1" strike="noStrike">
+              <a:latin typeface="Arial"/>
+            </a:endParaRPr>
+          </a:p>
+        </p:txBody>
+      </p:sp>
+      <p:sp>
+        <p:nvSpPr>
+          <p:cNvPr id="22" name="PlaceHolder 3"/>
           <p:cNvSpPr>
             <a:spLocks noGrp="1"/>
           </p:cNvSpPr>
@@ -2478,8 +2387,8 @@
         </p:nvSpPr>
         <p:spPr>
           <a:xfrm>
-            <a:off x="2361240" y="1152360"/>
-            <a:ext cx="1951560" cy="1629360"/>
+            <a:off x="1311480" y="1152360"/>
+            <a:ext cx="951840" cy="1629000"/>
           </a:xfrm>
           <a:prstGeom prst="rect">
             <a:avLst/>
@@ -2490,18 +2399,15 @@
             <a:normAutofit/>
           </a:bodyPr>
           <a:p>
-            <a:endParaRPr b="0" lang="en-US" sz="1400" spc="-1" strike="noStrike">
-              <a:solidFill>
-                <a:srgbClr val="000000"/>
-              </a:solidFill>
-              <a:latin typeface="Arial"/>
-            </a:endParaRPr>
-          </a:p>
-        </p:txBody>
-      </p:sp>
-      <p:sp>
-        <p:nvSpPr>
-          <p:cNvPr id="24" name="PlaceHolder 4"/>
+            <a:endParaRPr b="0" lang="en-US" sz="3200" spc="-1" strike="noStrike">
+              <a:latin typeface="Arial"/>
+            </a:endParaRPr>
+          </a:p>
+        </p:txBody>
+      </p:sp>
+      <p:sp>
+        <p:nvSpPr>
+          <p:cNvPr id="23" name="PlaceHolder 4"/>
           <p:cNvSpPr>
             <a:spLocks noGrp="1"/>
           </p:cNvSpPr>
@@ -2511,8 +2417,8 @@
         </p:nvSpPr>
         <p:spPr>
           <a:xfrm>
-            <a:off x="311760" y="2936880"/>
-            <a:ext cx="3999600" cy="1629360"/>
+            <a:off x="311760" y="2936520"/>
+            <a:ext cx="1951200" cy="1629000"/>
           </a:xfrm>
           <a:prstGeom prst="rect">
             <a:avLst/>
@@ -2523,10 +2429,7 @@
             <a:normAutofit/>
           </a:bodyPr>
           <a:p>
-            <a:endParaRPr b="0" lang="en-US" sz="1400" spc="-1" strike="noStrike">
-              <a:solidFill>
-                <a:srgbClr val="000000"/>
-              </a:solidFill>
+            <a:endParaRPr b="0" lang="en-US" sz="3200" spc="-1" strike="noStrike">
               <a:latin typeface="Arial"/>
             </a:endParaRPr>
           </a:p>
@@ -2574,64 +2477,22 @@
         <p:spPr>
           <a:xfrm>
             <a:off x="311760" y="444960"/>
-            <a:ext cx="8520120" cy="572400"/>
-          </a:xfrm>
-          <a:prstGeom prst="rect">
-            <a:avLst/>
-          </a:prstGeom>
-        </p:spPr>
-        <p:txBody>
-          <a:bodyPr tIns="91440" bIns="91440"/>
-          <a:p>
-            <a:r>
-              <a:rPr b="0" lang="en-US" sz="2800" spc="-1" strike="noStrike">
-                <a:solidFill>
-                  <a:srgbClr val="000000"/>
-                </a:solidFill>
-                <a:latin typeface="Arial"/>
-              </a:rPr>
-              <a:t>Click </a:t>
-            </a:r>
-            <a:r>
-              <a:rPr b="0" lang="en-US" sz="2800" spc="-1" strike="noStrike">
-                <a:solidFill>
-                  <a:srgbClr val="000000"/>
-                </a:solidFill>
-                <a:latin typeface="Arial"/>
-              </a:rPr>
-              <a:t>to edit </a:t>
-            </a:r>
-            <a:r>
-              <a:rPr b="0" lang="en-US" sz="2800" spc="-1" strike="noStrike">
-                <a:solidFill>
-                  <a:srgbClr val="000000"/>
-                </a:solidFill>
-                <a:latin typeface="Arial"/>
-              </a:rPr>
-              <a:t>the title </a:t>
-            </a:r>
-            <a:r>
-              <a:rPr b="0" lang="en-US" sz="2800" spc="-1" strike="noStrike">
-                <a:solidFill>
-                  <a:srgbClr val="000000"/>
-                </a:solidFill>
-                <a:latin typeface="Arial"/>
-              </a:rPr>
-              <a:t>text </a:t>
-            </a:r>
-            <a:r>
-              <a:rPr b="0" lang="en-US" sz="2800" spc="-1" strike="noStrike">
-                <a:solidFill>
-                  <a:srgbClr val="000000"/>
-                </a:solidFill>
-                <a:latin typeface="Arial"/>
-              </a:rPr>
-              <a:t>format</a:t>
-            </a:r>
-            <a:endParaRPr b="0" lang="en-US" sz="2800" spc="-1" strike="noStrike">
-              <a:solidFill>
-                <a:srgbClr val="000000"/>
-              </a:solidFill>
+            <a:ext cx="8519760" cy="572040"/>
+          </a:xfrm>
+          <a:prstGeom prst="rect">
+            <a:avLst/>
+          </a:prstGeom>
+        </p:spPr>
+        <p:txBody>
+          <a:bodyPr lIns="0" rIns="0" tIns="0" bIns="0" anchor="ctr"/>
+          <a:p>
+            <a:r>
+              <a:rPr b="0" lang="en-US" sz="1800" spc="-1" strike="noStrike">
+                <a:latin typeface="Arial"/>
+              </a:rPr>
+              <a:t>Click to edit the title text format</a:t>
+            </a:r>
+            <a:endParaRPr b="0" lang="en-US" sz="1800" spc="-1" strike="noStrike">
               <a:latin typeface="Arial"/>
             </a:endParaRPr>
           </a:p>
@@ -2650,14 +2511,16 @@
         <p:spPr>
           <a:xfrm>
             <a:off x="311760" y="1152360"/>
-            <a:ext cx="3999600" cy="3416040"/>
-          </a:xfrm>
-          <a:prstGeom prst="rect">
-            <a:avLst/>
-          </a:prstGeom>
-        </p:spPr>
-        <p:txBody>
-          <a:bodyPr tIns="91440" bIns="91440"/>
+            <a:ext cx="1951200" cy="3415680"/>
+          </a:xfrm>
+          <a:prstGeom prst="rect">
+            <a:avLst/>
+          </a:prstGeom>
+        </p:spPr>
+        <p:txBody>
+          <a:bodyPr lIns="0" rIns="0" tIns="0" bIns="0">
+            <a:normAutofit/>
+          </a:bodyPr>
           <a:p>
             <a:pPr marL="432000" indent="-324000">
               <a:spcBef>
@@ -2671,27 +2534,12 @@
               <a:buChar char=""/>
             </a:pPr>
             <a:r>
-              <a:rPr b="0" lang="en-US" sz="1400" spc="-1" strike="noStrike">
-                <a:solidFill>
-                  <a:srgbClr val="000000"/>
-                </a:solidFill>
-                <a:latin typeface="Arial"/>
-              </a:rPr>
-              <a:t>Click to edit the </a:t>
-            </a:r>
-            <a:r>
-              <a:rPr b="0" lang="en-US" sz="1400" spc="-1" strike="noStrike">
-                <a:solidFill>
-                  <a:srgbClr val="000000"/>
-                </a:solidFill>
-                <a:latin typeface="Arial"/>
-              </a:rPr>
-              <a:t>outline text format</a:t>
-            </a:r>
-            <a:endParaRPr b="0" lang="en-US" sz="1400" spc="-1" strike="noStrike">
-              <a:solidFill>
-                <a:srgbClr val="000000"/>
-              </a:solidFill>
+              <a:rPr b="0" lang="en-US" sz="1800" spc="-1" strike="noStrike">
+                <a:latin typeface="Arial"/>
+              </a:rPr>
+              <a:t>Click to edit the outline text format</a:t>
+            </a:r>
+            <a:endParaRPr b="0" lang="en-US" sz="1800" spc="-1" strike="noStrike">
               <a:latin typeface="Arial"/>
             </a:endParaRPr>
           </a:p>
@@ -2708,27 +2556,12 @@
               <a:buChar char=""/>
             </a:pPr>
             <a:r>
-              <a:rPr b="0" lang="en-US" sz="1400" spc="-1" strike="noStrike">
-                <a:solidFill>
-                  <a:srgbClr val="000000"/>
-                </a:solidFill>
-                <a:latin typeface="Arial"/>
-              </a:rPr>
-              <a:t>Second Outline </a:t>
-            </a:r>
-            <a:r>
-              <a:rPr b="0" lang="en-US" sz="1400" spc="-1" strike="noStrike">
-                <a:solidFill>
-                  <a:srgbClr val="000000"/>
-                </a:solidFill>
-                <a:latin typeface="Arial"/>
-              </a:rPr>
-              <a:t>Level</a:t>
-            </a:r>
-            <a:endParaRPr b="0" lang="en-US" sz="1400" spc="-1" strike="noStrike">
-              <a:solidFill>
-                <a:srgbClr val="000000"/>
-              </a:solidFill>
+              <a:rPr b="0" lang="en-US" sz="1800" spc="-1" strike="noStrike">
+                <a:latin typeface="Arial"/>
+              </a:rPr>
+              <a:t>Second Outline Level</a:t>
+            </a:r>
+            <a:endParaRPr b="0" lang="en-US" sz="1800" spc="-1" strike="noStrike">
               <a:latin typeface="Arial"/>
             </a:endParaRPr>
           </a:p>
@@ -2745,36 +2578,12 @@
               <a:buChar char=""/>
             </a:pPr>
             <a:r>
-              <a:rPr b="0" lang="en-US" sz="1400" spc="-1" strike="noStrike">
-                <a:solidFill>
-                  <a:srgbClr val="000000"/>
-                </a:solidFill>
-                <a:latin typeface="Arial"/>
-              </a:rPr>
-              <a:t>Third </a:t>
-            </a:r>
-            <a:r>
-              <a:rPr b="0" lang="en-US" sz="1400" spc="-1" strike="noStrike">
-                <a:solidFill>
-                  <a:srgbClr val="000000"/>
-                </a:solidFill>
-                <a:latin typeface="Arial"/>
-              </a:rPr>
-              <a:t>Outline </a:t>
-            </a:r>
-            <a:r>
-              <a:rPr b="0" lang="en-US" sz="1400" spc="-1" strike="noStrike">
-                <a:solidFill>
-                  <a:srgbClr val="000000"/>
-                </a:solidFill>
-                <a:latin typeface="Arial"/>
-              </a:rPr>
-              <a:t>Level</a:t>
-            </a:r>
-            <a:endParaRPr b="0" lang="en-US" sz="1400" spc="-1" strike="noStrike">
-              <a:solidFill>
-                <a:srgbClr val="000000"/>
-              </a:solidFill>
+              <a:rPr b="0" lang="en-US" sz="1800" spc="-1" strike="noStrike">
+                <a:latin typeface="Arial"/>
+              </a:rPr>
+              <a:t>Third Outline Level</a:t>
+            </a:r>
+            <a:endParaRPr b="0" lang="en-US" sz="1800" spc="-1" strike="noStrike">
               <a:latin typeface="Arial"/>
             </a:endParaRPr>
           </a:p>
@@ -2791,54 +2600,12 @@
               <a:buChar char=""/>
             </a:pPr>
             <a:r>
-              <a:rPr b="0" lang="en-US" sz="1400" spc="-1" strike="noStrike">
-                <a:solidFill>
-                  <a:srgbClr val="000000"/>
-                </a:solidFill>
-                <a:latin typeface="Arial"/>
-              </a:rPr>
-              <a:t>Fourt</a:t>
-            </a:r>
-            <a:r>
-              <a:rPr b="0" lang="en-US" sz="1400" spc="-1" strike="noStrike">
-                <a:solidFill>
-                  <a:srgbClr val="000000"/>
-                </a:solidFill>
-                <a:latin typeface="Arial"/>
-              </a:rPr>
-              <a:t>h </a:t>
-            </a:r>
-            <a:r>
-              <a:rPr b="0" lang="en-US" sz="1400" spc="-1" strike="noStrike">
-                <a:solidFill>
-                  <a:srgbClr val="000000"/>
-                </a:solidFill>
-                <a:latin typeface="Arial"/>
-              </a:rPr>
-              <a:t>Outli</a:t>
-            </a:r>
-            <a:r>
-              <a:rPr b="0" lang="en-US" sz="1400" spc="-1" strike="noStrike">
-                <a:solidFill>
-                  <a:srgbClr val="000000"/>
-                </a:solidFill>
-                <a:latin typeface="Arial"/>
-              </a:rPr>
-              <a:t>ne </a:t>
-            </a:r>
-            <a:r>
-              <a:rPr b="0" lang="en-US" sz="1400" spc="-1" strike="noStrike">
-                <a:solidFill>
-                  <a:srgbClr val="000000"/>
-                </a:solidFill>
-                <a:latin typeface="Arial"/>
-              </a:rPr>
-              <a:t>Level</a:t>
-            </a:r>
-            <a:endParaRPr b="0" lang="en-US" sz="1400" spc="-1" strike="noStrike">
-              <a:solidFill>
-                <a:srgbClr val="000000"/>
-              </a:solidFill>
+              <a:rPr b="0" lang="en-US" sz="1800" spc="-1" strike="noStrike">
+                <a:latin typeface="Arial"/>
+              </a:rPr>
+              <a:t>Fourth Outline Level</a:t>
+            </a:r>
+            <a:endParaRPr b="0" lang="en-US" sz="1800" spc="-1" strike="noStrike">
               <a:latin typeface="Arial"/>
             </a:endParaRPr>
           </a:p>
@@ -2855,180 +2622,12 @@
               <a:buChar char=""/>
             </a:pPr>
             <a:r>
-              <a:rPr b="0" lang="en-US" sz="1400" spc="-1" strike="noStrike">
-                <a:solidFill>
-                  <a:srgbClr val="000000"/>
-                </a:solidFill>
-                <a:latin typeface="Arial"/>
-              </a:rPr>
-              <a:t>F</a:t>
-            </a:r>
-            <a:r>
-              <a:rPr b="0" lang="en-US" sz="1400" spc="-1" strike="noStrike">
-                <a:solidFill>
-                  <a:srgbClr val="000000"/>
-                </a:solidFill>
-                <a:latin typeface="Arial"/>
-              </a:rPr>
-              <a:t>i</a:t>
-            </a:r>
-            <a:r>
-              <a:rPr b="0" lang="en-US" sz="1400" spc="-1" strike="noStrike">
-                <a:solidFill>
-                  <a:srgbClr val="000000"/>
-                </a:solidFill>
-                <a:latin typeface="Arial"/>
-              </a:rPr>
-              <a:t>f</a:t>
-            </a:r>
-            <a:r>
-              <a:rPr b="0" lang="en-US" sz="1400" spc="-1" strike="noStrike">
-                <a:solidFill>
-                  <a:srgbClr val="000000"/>
-                </a:solidFill>
-                <a:latin typeface="Arial"/>
-              </a:rPr>
-              <a:t>t</a:t>
-            </a:r>
-            <a:r>
-              <a:rPr b="0" lang="en-US" sz="1400" spc="-1" strike="noStrike">
-                <a:solidFill>
-                  <a:srgbClr val="000000"/>
-                </a:solidFill>
-                <a:latin typeface="Arial"/>
-              </a:rPr>
-              <a:t>h</a:t>
-            </a:r>
-            <a:r>
-              <a:rPr b="0" lang="en-US" sz="1400" spc="-1" strike="noStrike">
-                <a:solidFill>
-                  <a:srgbClr val="000000"/>
-                </a:solidFill>
-                <a:latin typeface="Arial"/>
-              </a:rPr>
-              <a:t> </a:t>
-            </a:r>
-            <a:r>
-              <a:rPr b="0" lang="en-US" sz="1400" spc="-1" strike="noStrike">
-                <a:solidFill>
-                  <a:srgbClr val="000000"/>
-                </a:solidFill>
-                <a:latin typeface="Arial"/>
-              </a:rPr>
-              <a:t>O</a:t>
-            </a:r>
-            <a:r>
-              <a:rPr b="0" lang="en-US" sz="1400" spc="-1" strike="noStrike">
-                <a:solidFill>
-                  <a:srgbClr val="000000"/>
-                </a:solidFill>
-                <a:latin typeface="Arial"/>
-              </a:rPr>
-              <a:t>u</a:t>
-            </a:r>
-            <a:r>
-              <a:rPr b="0" lang="en-US" sz="1400" spc="-1" strike="noStrike">
-                <a:solidFill>
-                  <a:srgbClr val="000000"/>
-                </a:solidFill>
-                <a:latin typeface="Arial"/>
-              </a:rPr>
-              <a:t>t</a:t>
-            </a:r>
-            <a:r>
-              <a:rPr b="0" lang="en-US" sz="1400" spc="-1" strike="noStrike">
-                <a:solidFill>
-                  <a:srgbClr val="000000"/>
-                </a:solidFill>
-                <a:latin typeface="Arial"/>
-              </a:rPr>
-              <a:t>l</a:t>
-            </a:r>
-            <a:r>
-              <a:rPr b="0" lang="en-US" sz="1400" spc="-1" strike="noStrike">
-                <a:solidFill>
-                  <a:srgbClr val="000000"/>
-                </a:solidFill>
-                <a:latin typeface="Arial"/>
-              </a:rPr>
-              <a:t>i</a:t>
-            </a:r>
-            <a:r>
-              <a:rPr b="0" lang="en-US" sz="1400" spc="-1" strike="noStrike">
-                <a:solidFill>
-                  <a:srgbClr val="000000"/>
-                </a:solidFill>
-                <a:latin typeface="Arial"/>
-              </a:rPr>
-              <a:t>n</a:t>
-            </a:r>
-            <a:r>
-              <a:rPr b="0" lang="en-US" sz="1400" spc="-1" strike="noStrike">
-                <a:solidFill>
-                  <a:srgbClr val="000000"/>
-                </a:solidFill>
-                <a:latin typeface="Arial"/>
-              </a:rPr>
-              <a:t>e</a:t>
-            </a:r>
-            <a:r>
-              <a:rPr b="0" lang="en-US" sz="1400" spc="-1" strike="noStrike">
-                <a:solidFill>
-                  <a:srgbClr val="000000"/>
-                </a:solidFill>
-                <a:latin typeface="Arial"/>
-              </a:rPr>
-              <a:t> </a:t>
-            </a:r>
-            <a:r>
-              <a:rPr b="0" lang="en-US" sz="1400" spc="-1" strike="noStrike">
-                <a:solidFill>
-                  <a:srgbClr val="000000"/>
-                </a:solidFill>
-                <a:latin typeface="Arial"/>
-              </a:rPr>
-              <a:t>L</a:t>
-            </a:r>
-            <a:r>
-              <a:rPr b="0" lang="en-US" sz="1400" spc="-1" strike="noStrike">
-                <a:solidFill>
-                  <a:srgbClr val="000000"/>
-                </a:solidFill>
-                <a:latin typeface="Arial"/>
-              </a:rPr>
-              <a:t>e</a:t>
-            </a:r>
-            <a:r>
-              <a:rPr b="0" lang="en-US" sz="1400" spc="-1" strike="noStrike">
-                <a:solidFill>
-                  <a:srgbClr val="000000"/>
-                </a:solidFill>
-                <a:latin typeface="Arial"/>
-              </a:rPr>
-              <a:t>v</a:t>
-            </a:r>
-            <a:r>
-              <a:rPr b="0" lang="en-US" sz="1400" spc="-1" strike="noStrike">
-                <a:solidFill>
-                  <a:srgbClr val="000000"/>
-                </a:solidFill>
-                <a:latin typeface="Arial"/>
-              </a:rPr>
-              <a:t>e</a:t>
-            </a:r>
-            <a:r>
-              <a:rPr b="0" lang="en-US" sz="1400" spc="-1" strike="noStrike">
-                <a:solidFill>
-                  <a:srgbClr val="000000"/>
-                </a:solidFill>
-                <a:latin typeface="Arial"/>
-              </a:rPr>
-              <a:t>l</a:t>
-            </a:r>
-            <a:endParaRPr b="0" lang="en-US" sz="1400" spc="-1" strike="noStrike">
-              <a:solidFill>
-                <a:srgbClr val="000000"/>
-              </a:solidFill>
+              <a:rPr b="0" lang="en-US" sz="1800" spc="-1" strike="noStrike">
+                <a:latin typeface="Arial"/>
+              </a:rPr>
+              <a:t>Fifth Outline Level</a:t>
+            </a:r>
+            <a:endParaRPr b="0" lang="en-US" sz="1800" spc="-1" strike="noStrike">
               <a:latin typeface="Arial"/>
             </a:endParaRPr>
           </a:p>
@@ -3045,180 +2644,12 @@
               <a:buChar char=""/>
             </a:pPr>
             <a:r>
-              <a:rPr b="0" lang="en-US" sz="1400" spc="-1" strike="noStrike">
-                <a:solidFill>
-                  <a:srgbClr val="000000"/>
-                </a:solidFill>
-                <a:latin typeface="Arial"/>
-              </a:rPr>
-              <a:t>S</a:t>
-            </a:r>
-            <a:r>
-              <a:rPr b="0" lang="en-US" sz="1400" spc="-1" strike="noStrike">
-                <a:solidFill>
-                  <a:srgbClr val="000000"/>
-                </a:solidFill>
-                <a:latin typeface="Arial"/>
-              </a:rPr>
-              <a:t>i</a:t>
-            </a:r>
-            <a:r>
-              <a:rPr b="0" lang="en-US" sz="1400" spc="-1" strike="noStrike">
-                <a:solidFill>
-                  <a:srgbClr val="000000"/>
-                </a:solidFill>
-                <a:latin typeface="Arial"/>
-              </a:rPr>
-              <a:t>x</a:t>
-            </a:r>
-            <a:r>
-              <a:rPr b="0" lang="en-US" sz="1400" spc="-1" strike="noStrike">
-                <a:solidFill>
-                  <a:srgbClr val="000000"/>
-                </a:solidFill>
-                <a:latin typeface="Arial"/>
-              </a:rPr>
-              <a:t>t</a:t>
-            </a:r>
-            <a:r>
-              <a:rPr b="0" lang="en-US" sz="1400" spc="-1" strike="noStrike">
-                <a:solidFill>
-                  <a:srgbClr val="000000"/>
-                </a:solidFill>
-                <a:latin typeface="Arial"/>
-              </a:rPr>
-              <a:t>h</a:t>
-            </a:r>
-            <a:r>
-              <a:rPr b="0" lang="en-US" sz="1400" spc="-1" strike="noStrike">
-                <a:solidFill>
-                  <a:srgbClr val="000000"/>
-                </a:solidFill>
-                <a:latin typeface="Arial"/>
-              </a:rPr>
-              <a:t> </a:t>
-            </a:r>
-            <a:r>
-              <a:rPr b="0" lang="en-US" sz="1400" spc="-1" strike="noStrike">
-                <a:solidFill>
-                  <a:srgbClr val="000000"/>
-                </a:solidFill>
-                <a:latin typeface="Arial"/>
-              </a:rPr>
-              <a:t>O</a:t>
-            </a:r>
-            <a:r>
-              <a:rPr b="0" lang="en-US" sz="1400" spc="-1" strike="noStrike">
-                <a:solidFill>
-                  <a:srgbClr val="000000"/>
-                </a:solidFill>
-                <a:latin typeface="Arial"/>
-              </a:rPr>
-              <a:t>u</a:t>
-            </a:r>
-            <a:r>
-              <a:rPr b="0" lang="en-US" sz="1400" spc="-1" strike="noStrike">
-                <a:solidFill>
-                  <a:srgbClr val="000000"/>
-                </a:solidFill>
-                <a:latin typeface="Arial"/>
-              </a:rPr>
-              <a:t>t</a:t>
-            </a:r>
-            <a:r>
-              <a:rPr b="0" lang="en-US" sz="1400" spc="-1" strike="noStrike">
-                <a:solidFill>
-                  <a:srgbClr val="000000"/>
-                </a:solidFill>
-                <a:latin typeface="Arial"/>
-              </a:rPr>
-              <a:t>l</a:t>
-            </a:r>
-            <a:r>
-              <a:rPr b="0" lang="en-US" sz="1400" spc="-1" strike="noStrike">
-                <a:solidFill>
-                  <a:srgbClr val="000000"/>
-                </a:solidFill>
-                <a:latin typeface="Arial"/>
-              </a:rPr>
-              <a:t>i</a:t>
-            </a:r>
-            <a:r>
-              <a:rPr b="0" lang="en-US" sz="1400" spc="-1" strike="noStrike">
-                <a:solidFill>
-                  <a:srgbClr val="000000"/>
-                </a:solidFill>
-                <a:latin typeface="Arial"/>
-              </a:rPr>
-              <a:t>n</a:t>
-            </a:r>
-            <a:r>
-              <a:rPr b="0" lang="en-US" sz="1400" spc="-1" strike="noStrike">
-                <a:solidFill>
-                  <a:srgbClr val="000000"/>
-                </a:solidFill>
-                <a:latin typeface="Arial"/>
-              </a:rPr>
-              <a:t>e</a:t>
-            </a:r>
-            <a:r>
-              <a:rPr b="0" lang="en-US" sz="1400" spc="-1" strike="noStrike">
-                <a:solidFill>
-                  <a:srgbClr val="000000"/>
-                </a:solidFill>
-                <a:latin typeface="Arial"/>
-              </a:rPr>
-              <a:t> </a:t>
-            </a:r>
-            <a:r>
-              <a:rPr b="0" lang="en-US" sz="1400" spc="-1" strike="noStrike">
-                <a:solidFill>
-                  <a:srgbClr val="000000"/>
-                </a:solidFill>
-                <a:latin typeface="Arial"/>
-              </a:rPr>
-              <a:t>L</a:t>
-            </a:r>
-            <a:r>
-              <a:rPr b="0" lang="en-US" sz="1400" spc="-1" strike="noStrike">
-                <a:solidFill>
-                  <a:srgbClr val="000000"/>
-                </a:solidFill>
-                <a:latin typeface="Arial"/>
-              </a:rPr>
-              <a:t>e</a:t>
-            </a:r>
-            <a:r>
-              <a:rPr b="0" lang="en-US" sz="1400" spc="-1" strike="noStrike">
-                <a:solidFill>
-                  <a:srgbClr val="000000"/>
-                </a:solidFill>
-                <a:latin typeface="Arial"/>
-              </a:rPr>
-              <a:t>v</a:t>
-            </a:r>
-            <a:r>
-              <a:rPr b="0" lang="en-US" sz="1400" spc="-1" strike="noStrike">
-                <a:solidFill>
-                  <a:srgbClr val="000000"/>
-                </a:solidFill>
-                <a:latin typeface="Arial"/>
-              </a:rPr>
-              <a:t>e</a:t>
-            </a:r>
-            <a:r>
-              <a:rPr b="0" lang="en-US" sz="1400" spc="-1" strike="noStrike">
-                <a:solidFill>
-                  <a:srgbClr val="000000"/>
-                </a:solidFill>
-                <a:latin typeface="Arial"/>
-              </a:rPr>
-              <a:t>l</a:t>
-            </a:r>
-            <a:endParaRPr b="0" lang="en-US" sz="1400" spc="-1" strike="noStrike">
-              <a:solidFill>
-                <a:srgbClr val="000000"/>
-              </a:solidFill>
+              <a:rPr b="0" lang="en-US" sz="1800" spc="-1" strike="noStrike">
+                <a:latin typeface="Arial"/>
+              </a:rPr>
+              <a:t>Sixth Outline Level</a:t>
+            </a:r>
+            <a:endParaRPr b="0" lang="en-US" sz="1800" spc="-1" strike="noStrike">
               <a:latin typeface="Arial"/>
             </a:endParaRPr>
           </a:p>
@@ -3235,198 +2666,12 @@
               <a:buChar char=""/>
             </a:pPr>
             <a:r>
-              <a:rPr b="0" lang="en-US" sz="1400" spc="-1" strike="noStrike">
-                <a:solidFill>
-                  <a:srgbClr val="000000"/>
-                </a:solidFill>
-                <a:latin typeface="Arial"/>
-              </a:rPr>
-              <a:t>S</a:t>
-            </a:r>
-            <a:r>
-              <a:rPr b="0" lang="en-US" sz="1400" spc="-1" strike="noStrike">
-                <a:solidFill>
-                  <a:srgbClr val="000000"/>
-                </a:solidFill>
-                <a:latin typeface="Arial"/>
-              </a:rPr>
-              <a:t>e</a:t>
-            </a:r>
-            <a:r>
-              <a:rPr b="0" lang="en-US" sz="1400" spc="-1" strike="noStrike">
-                <a:solidFill>
-                  <a:srgbClr val="000000"/>
-                </a:solidFill>
-                <a:latin typeface="Arial"/>
-              </a:rPr>
-              <a:t>v</a:t>
-            </a:r>
-            <a:r>
-              <a:rPr b="0" lang="en-US" sz="1400" spc="-1" strike="noStrike">
-                <a:solidFill>
-                  <a:srgbClr val="000000"/>
-                </a:solidFill>
-                <a:latin typeface="Arial"/>
-              </a:rPr>
-              <a:t>e</a:t>
-            </a:r>
-            <a:r>
-              <a:rPr b="0" lang="en-US" sz="1400" spc="-1" strike="noStrike">
-                <a:solidFill>
-                  <a:srgbClr val="000000"/>
-                </a:solidFill>
-                <a:latin typeface="Arial"/>
-              </a:rPr>
-              <a:t>n</a:t>
-            </a:r>
-            <a:r>
-              <a:rPr b="0" lang="en-US" sz="1400" spc="-1" strike="noStrike">
-                <a:solidFill>
-                  <a:srgbClr val="000000"/>
-                </a:solidFill>
-                <a:latin typeface="Arial"/>
-              </a:rPr>
-              <a:t>t</a:t>
-            </a:r>
-            <a:r>
-              <a:rPr b="0" lang="en-US" sz="1400" spc="-1" strike="noStrike">
-                <a:solidFill>
-                  <a:srgbClr val="000000"/>
-                </a:solidFill>
-                <a:latin typeface="Arial"/>
-              </a:rPr>
-              <a:t>h</a:t>
-            </a:r>
-            <a:r>
-              <a:rPr b="0" lang="en-US" sz="1400" spc="-1" strike="noStrike">
-                <a:solidFill>
-                  <a:srgbClr val="000000"/>
-                </a:solidFill>
-                <a:latin typeface="Arial"/>
-              </a:rPr>
-              <a:t> </a:t>
-            </a:r>
-            <a:r>
-              <a:rPr b="0" lang="en-US" sz="1400" spc="-1" strike="noStrike">
-                <a:solidFill>
-                  <a:srgbClr val="000000"/>
-                </a:solidFill>
-                <a:latin typeface="Arial"/>
-              </a:rPr>
-              <a:t>O</a:t>
-            </a:r>
-            <a:r>
-              <a:rPr b="0" lang="en-US" sz="1400" spc="-1" strike="noStrike">
-                <a:solidFill>
-                  <a:srgbClr val="000000"/>
-                </a:solidFill>
-                <a:latin typeface="Arial"/>
-              </a:rPr>
-              <a:t>u</a:t>
-            </a:r>
-            <a:r>
-              <a:rPr b="0" lang="en-US" sz="1400" spc="-1" strike="noStrike">
-                <a:solidFill>
-                  <a:srgbClr val="000000"/>
-                </a:solidFill>
-                <a:latin typeface="Arial"/>
-              </a:rPr>
-              <a:t>t</a:t>
-            </a:r>
-            <a:r>
-              <a:rPr b="0" lang="en-US" sz="1400" spc="-1" strike="noStrike">
-                <a:solidFill>
-                  <a:srgbClr val="000000"/>
-                </a:solidFill>
-                <a:latin typeface="Arial"/>
-              </a:rPr>
-              <a:t>l</a:t>
-            </a:r>
-            <a:r>
-              <a:rPr b="0" lang="en-US" sz="1400" spc="-1" strike="noStrike">
-                <a:solidFill>
-                  <a:srgbClr val="000000"/>
-                </a:solidFill>
-                <a:latin typeface="Arial"/>
-              </a:rPr>
-              <a:t>i</a:t>
-            </a:r>
-            <a:r>
-              <a:rPr b="0" lang="en-US" sz="1400" spc="-1" strike="noStrike">
-                <a:solidFill>
-                  <a:srgbClr val="000000"/>
-                </a:solidFill>
-                <a:latin typeface="Arial"/>
-              </a:rPr>
-              <a:t>n</a:t>
-            </a:r>
-            <a:r>
-              <a:rPr b="0" lang="en-US" sz="1400" spc="-1" strike="noStrike">
-                <a:solidFill>
-                  <a:srgbClr val="000000"/>
-                </a:solidFill>
-                <a:latin typeface="Arial"/>
-              </a:rPr>
-              <a:t>e</a:t>
-            </a:r>
-            <a:r>
-              <a:rPr b="0" lang="en-US" sz="1400" spc="-1" strike="noStrike">
-                <a:solidFill>
-                  <a:srgbClr val="000000"/>
-                </a:solidFill>
-                <a:latin typeface="Arial"/>
-              </a:rPr>
-              <a:t> </a:t>
-            </a:r>
-            <a:r>
-              <a:rPr b="0" lang="en-US" sz="1400" spc="-1" strike="noStrike">
-                <a:solidFill>
-                  <a:srgbClr val="000000"/>
-                </a:solidFill>
-                <a:latin typeface="Arial"/>
-              </a:rPr>
-              <a:t>L</a:t>
-            </a:r>
-            <a:r>
-              <a:rPr b="0" lang="en-US" sz="1400" spc="-1" strike="noStrike">
-                <a:solidFill>
-                  <a:srgbClr val="000000"/>
-                </a:solidFill>
-                <a:latin typeface="Arial"/>
-              </a:rPr>
-              <a:t>e</a:t>
-            </a:r>
-            <a:r>
-              <a:rPr b="0" lang="en-US" sz="1400" spc="-1" strike="noStrike">
-                <a:solidFill>
-                  <a:srgbClr val="000000"/>
-                </a:solidFill>
-                <a:latin typeface="Arial"/>
-              </a:rPr>
-              <a:t>v</a:t>
-            </a:r>
-            <a:r>
-              <a:rPr b="0" lang="en-US" sz="1400" spc="-1" strike="noStrike">
-                <a:solidFill>
-                  <a:srgbClr val="000000"/>
-                </a:solidFill>
-                <a:latin typeface="Arial"/>
-              </a:rPr>
-              <a:t>e</a:t>
-            </a:r>
-            <a:r>
-              <a:rPr b="0" lang="en-US" sz="1400" spc="-1" strike="noStrike">
-                <a:solidFill>
-                  <a:srgbClr val="000000"/>
-                </a:solidFill>
-                <a:latin typeface="Arial"/>
-              </a:rPr>
-              <a:t>l</a:t>
-            </a:r>
-            <a:endParaRPr b="0" lang="en-US" sz="1400" spc="-1" strike="noStrike">
-              <a:solidFill>
-                <a:srgbClr val="000000"/>
-              </a:solidFill>
+              <a:rPr b="0" lang="en-US" sz="1800" spc="-1" strike="noStrike">
+                <a:latin typeface="Arial"/>
+              </a:rPr>
+              <a:t>Seventh Outline Level</a:t>
+            </a:r>
+            <a:endParaRPr b="0" lang="en-US" sz="1800" spc="-1" strike="noStrike">
               <a:latin typeface="Arial"/>
             </a:endParaRPr>
           </a:p>
@@ -3444,15 +2689,17 @@
         </p:nvSpPr>
         <p:spPr>
           <a:xfrm>
-            <a:off x="4832280" y="1152360"/>
-            <a:ext cx="3999600" cy="3416040"/>
-          </a:xfrm>
-          <a:prstGeom prst="rect">
-            <a:avLst/>
-          </a:prstGeom>
-        </p:spPr>
-        <p:txBody>
-          <a:bodyPr tIns="91440" bIns="91440"/>
+            <a:off x="2361240" y="1152360"/>
+            <a:ext cx="1951200" cy="3415680"/>
+          </a:xfrm>
+          <a:prstGeom prst="rect">
+            <a:avLst/>
+          </a:prstGeom>
+        </p:spPr>
+        <p:txBody>
+          <a:bodyPr lIns="0" rIns="0" tIns="0" bIns="0">
+            <a:normAutofit/>
+          </a:bodyPr>
           <a:p>
             <a:pPr marL="432000" indent="-324000">
               <a:spcBef>
@@ -3466,18 +2713,12 @@
               <a:buChar char=""/>
             </a:pPr>
             <a:r>
-              <a:rPr b="0" lang="en-US" sz="1400" spc="-1" strike="noStrike">
-                <a:solidFill>
-                  <a:srgbClr val="000000"/>
-                </a:solidFill>
+              <a:rPr b="0" lang="en-US" sz="1800" spc="-1" strike="noStrike">
                 <a:latin typeface="Arial"/>
               </a:rPr>
               <a:t>Click to edit the outline text format</a:t>
             </a:r>
-            <a:endParaRPr b="0" lang="en-US" sz="1400" spc="-1" strike="noStrike">
-              <a:solidFill>
-                <a:srgbClr val="000000"/>
-              </a:solidFill>
+            <a:endParaRPr b="0" lang="en-US" sz="1800" spc="-1" strike="noStrike">
               <a:latin typeface="Arial"/>
             </a:endParaRPr>
           </a:p>
@@ -3494,18 +2735,12 @@
               <a:buChar char=""/>
             </a:pPr>
             <a:r>
-              <a:rPr b="0" lang="en-US" sz="1400" spc="-1" strike="noStrike">
-                <a:solidFill>
-                  <a:srgbClr val="000000"/>
-                </a:solidFill>
+              <a:rPr b="0" lang="en-US" sz="1800" spc="-1" strike="noStrike">
                 <a:latin typeface="Arial"/>
               </a:rPr>
               <a:t>Second Outline Level</a:t>
             </a:r>
-            <a:endParaRPr b="0" lang="en-US" sz="1400" spc="-1" strike="noStrike">
-              <a:solidFill>
-                <a:srgbClr val="000000"/>
-              </a:solidFill>
+            <a:endParaRPr b="0" lang="en-US" sz="1800" spc="-1" strike="noStrike">
               <a:latin typeface="Arial"/>
             </a:endParaRPr>
           </a:p>
@@ -3522,18 +2757,12 @@
               <a:buChar char=""/>
             </a:pPr>
             <a:r>
-              <a:rPr b="0" lang="en-US" sz="1400" spc="-1" strike="noStrike">
-                <a:solidFill>
-                  <a:srgbClr val="000000"/>
-                </a:solidFill>
+              <a:rPr b="0" lang="en-US" sz="1800" spc="-1" strike="noStrike">
                 <a:latin typeface="Arial"/>
               </a:rPr>
               <a:t>Third Outline Level</a:t>
             </a:r>
-            <a:endParaRPr b="0" lang="en-US" sz="1400" spc="-1" strike="noStrike">
-              <a:solidFill>
-                <a:srgbClr val="000000"/>
-              </a:solidFill>
+            <a:endParaRPr b="0" lang="en-US" sz="1800" spc="-1" strike="noStrike">
               <a:latin typeface="Arial"/>
             </a:endParaRPr>
           </a:p>
@@ -3550,18 +2779,12 @@
               <a:buChar char=""/>
             </a:pPr>
             <a:r>
-              <a:rPr b="0" lang="en-US" sz="1400" spc="-1" strike="noStrike">
-                <a:solidFill>
-                  <a:srgbClr val="000000"/>
-                </a:solidFill>
+              <a:rPr b="0" lang="en-US" sz="1800" spc="-1" strike="noStrike">
                 <a:latin typeface="Arial"/>
               </a:rPr>
               <a:t>Fourth Outline Level</a:t>
             </a:r>
-            <a:endParaRPr b="0" lang="en-US" sz="1400" spc="-1" strike="noStrike">
-              <a:solidFill>
-                <a:srgbClr val="000000"/>
-              </a:solidFill>
+            <a:endParaRPr b="0" lang="en-US" sz="1800" spc="-1" strike="noStrike">
               <a:latin typeface="Arial"/>
             </a:endParaRPr>
           </a:p>
@@ -3578,18 +2801,12 @@
               <a:buChar char=""/>
             </a:pPr>
             <a:r>
-              <a:rPr b="0" lang="en-US" sz="1400" spc="-1" strike="noStrike">
-                <a:solidFill>
-                  <a:srgbClr val="000000"/>
-                </a:solidFill>
+              <a:rPr b="0" lang="en-US" sz="1800" spc="-1" strike="noStrike">
                 <a:latin typeface="Arial"/>
               </a:rPr>
               <a:t>Fifth Outline Level</a:t>
             </a:r>
-            <a:endParaRPr b="0" lang="en-US" sz="1400" spc="-1" strike="noStrike">
-              <a:solidFill>
-                <a:srgbClr val="000000"/>
-              </a:solidFill>
+            <a:endParaRPr b="0" lang="en-US" sz="1800" spc="-1" strike="noStrike">
               <a:latin typeface="Arial"/>
             </a:endParaRPr>
           </a:p>
@@ -3606,18 +2823,12 @@
               <a:buChar char=""/>
             </a:pPr>
             <a:r>
-              <a:rPr b="0" lang="en-US" sz="1400" spc="-1" strike="noStrike">
-                <a:solidFill>
-                  <a:srgbClr val="000000"/>
-                </a:solidFill>
+              <a:rPr b="0" lang="en-US" sz="1800" spc="-1" strike="noStrike">
                 <a:latin typeface="Arial"/>
               </a:rPr>
               <a:t>Sixth Outline Level</a:t>
             </a:r>
-            <a:endParaRPr b="0" lang="en-US" sz="1400" spc="-1" strike="noStrike">
-              <a:solidFill>
-                <a:srgbClr val="000000"/>
-              </a:solidFill>
+            <a:endParaRPr b="0" lang="en-US" sz="1800" spc="-1" strike="noStrike">
               <a:latin typeface="Arial"/>
             </a:endParaRPr>
           </a:p>
@@ -3634,62 +2845,13 @@
               <a:buChar char=""/>
             </a:pPr>
             <a:r>
-              <a:rPr b="0" lang="en-US" sz="1400" spc="-1" strike="noStrike">
-                <a:solidFill>
-                  <a:srgbClr val="000000"/>
-                </a:solidFill>
+              <a:rPr b="0" lang="en-US" sz="1800" spc="-1" strike="noStrike">
                 <a:latin typeface="Arial"/>
               </a:rPr>
               <a:t>Seventh Outline Level</a:t>
             </a:r>
-            <a:endParaRPr b="0" lang="en-US" sz="1400" spc="-1" strike="noStrike">
-              <a:solidFill>
-                <a:srgbClr val="000000"/>
-              </a:solidFill>
-              <a:latin typeface="Arial"/>
-            </a:endParaRPr>
-          </a:p>
-        </p:txBody>
-      </p:sp>
-      <p:sp>
-        <p:nvSpPr>
-          <p:cNvPr id="3" name="PlaceHolder 4"/>
-          <p:cNvSpPr>
-            <a:spLocks noGrp="1"/>
-          </p:cNvSpPr>
-          <p:nvPr>
-            <p:ph type="sldNum"/>
-          </p:nvPr>
-        </p:nvSpPr>
-        <p:spPr>
-          <a:xfrm>
-            <a:off x="8472600" y="4663080"/>
-            <a:ext cx="548280" cy="393120"/>
-          </a:xfrm>
-          <a:prstGeom prst="rect">
-            <a:avLst/>
-          </a:prstGeom>
-        </p:spPr>
-        <p:txBody>
-          <a:bodyPr tIns="91440" bIns="91440" anchor="ctr"/>
-          <a:p>
-            <a:pPr algn="r">
-              <a:lnSpc>
-                <a:spcPct val="100000"/>
-              </a:lnSpc>
-            </a:pPr>
-            <a:fld id="{14A0287F-A502-4A4C-9EAC-8A046B3EADAD}" type="slidenum">
-              <a:rPr b="0" lang="en-US" sz="1000" spc="-1" strike="noStrike">
-                <a:solidFill>
-                  <a:srgbClr val="595959"/>
-                </a:solidFill>
-                <a:latin typeface="Arial"/>
-                <a:ea typeface="Arial"/>
-              </a:rPr>
-              <a:t>&lt;number&gt;</a:t>
-            </a:fld>
-            <a:endParaRPr b="0" lang="en-US" sz="1000" spc="-1" strike="noStrike">
-              <a:latin typeface="Times New Roman"/>
+            <a:endParaRPr b="0" lang="en-US" sz="1800" spc="-1" strike="noStrike">
+              <a:latin typeface="Arial"/>
             </a:endParaRPr>
           </a:p>
         </p:txBody>
@@ -3733,14 +2895,14 @@
       </p:grpSpPr>
       <p:sp>
         <p:nvSpPr>
-          <p:cNvPr id="46" name="TextShape 1"/>
-          <p:cNvSpPr txBox="1"/>
+          <p:cNvPr id="45" name="CustomShape 1"/>
+          <p:cNvSpPr/>
           <p:nvPr/>
         </p:nvSpPr>
         <p:spPr>
           <a:xfrm>
-            <a:off x="6372360" y="1386000"/>
-            <a:ext cx="2376720" cy="3105000"/>
+            <a:off x="6372360" y="914400"/>
+            <a:ext cx="2588760" cy="3931920"/>
           </a:xfrm>
           <a:prstGeom prst="rect">
             <a:avLst/>
@@ -3755,8 +2917,14 @@
             <a:round/>
           </a:ln>
         </p:spPr>
-        <p:txBody>
-          <a:bodyPr tIns="91440" bIns="91440"/>
+        <p:style>
+          <a:lnRef idx="0"/>
+          <a:fillRef idx="0"/>
+          <a:effectRef idx="0"/>
+          <a:fontRef idx="minor"/>
+        </p:style>
+        <p:txBody>
+          <a:bodyPr lIns="90000" rIns="90000" tIns="91440" bIns="91440"/>
           <a:p>
             <a:pPr>
               <a:lnSpc>
@@ -3774,27 +2942,47 @@
                 <a:latin typeface="Open Sans"/>
                 <a:ea typeface="Open Sans"/>
               </a:rPr>
-              <a:t>We can see both store staff members filled in almost the same number of rental orders during each time unit.</a:t>
+              <a:t>How do the rentals for the 10 top renting countries compare to the other countries for each category?</a:t>
             </a:r>
             <a:endParaRPr b="0" lang="en-US" sz="1400" spc="-1" strike="noStrike">
-              <a:solidFill>
-                <a:srgbClr val="000000"/>
-              </a:solidFill>
-              <a:latin typeface="Arial"/>
-            </a:endParaRPr>
-          </a:p>
-        </p:txBody>
-      </p:sp>
-      <p:sp>
-        <p:nvSpPr>
-          <p:cNvPr id="47" name="TextShape 2"/>
-          <p:cNvSpPr txBox="1"/>
+              <a:latin typeface="Arial"/>
+            </a:endParaRPr>
+          </a:p>
+          <a:p>
+            <a:pPr>
+              <a:lnSpc>
+                <a:spcPct val="115000"/>
+              </a:lnSpc>
+              <a:spcAft>
+                <a:spcPts val="1599"/>
+              </a:spcAft>
+            </a:pPr>
+            <a:r>
+              <a:rPr b="0" lang="en-US" sz="1400" spc="-1" strike="noStrike">
+                <a:solidFill>
+                  <a:srgbClr val="595959"/>
+                </a:solidFill>
+                <a:latin typeface="Open Sans"/>
+                <a:ea typeface="Open Sans"/>
+              </a:rPr>
+              <a:t>Description: This bar chart shows the comparison between the number of rentals of the top 10 renting countries and the rest of the countries.</a:t>
+            </a:r>
+            <a:endParaRPr b="0" lang="en-US" sz="1400" spc="-1" strike="noStrike">
+              <a:latin typeface="Arial"/>
+            </a:endParaRPr>
+          </a:p>
+        </p:txBody>
+      </p:sp>
+      <p:sp>
+        <p:nvSpPr>
+          <p:cNvPr id="46" name="CustomShape 2"/>
+          <p:cNvSpPr/>
           <p:nvPr/>
         </p:nvSpPr>
         <p:spPr>
           <a:xfrm>
             <a:off x="0" y="0"/>
-            <a:ext cx="9143640" cy="795240"/>
+            <a:ext cx="9143280" cy="794880"/>
           </a:xfrm>
           <a:prstGeom prst="rect">
             <a:avLst/>
@@ -3806,8 +2994,14 @@
             <a:noFill/>
           </a:ln>
         </p:spPr>
-        <p:txBody>
-          <a:bodyPr tIns="91440" bIns="91440" anchor="ctr"/>
+        <p:style>
+          <a:lnRef idx="0"/>
+          <a:fillRef idx="0"/>
+          <a:effectRef idx="0"/>
+          <a:fontRef idx="minor"/>
+        </p:style>
+        <p:txBody>
+          <a:bodyPr lIns="90000" rIns="90000" tIns="91440" bIns="91440" anchor="ctr"/>
           <a:p>
             <a:pPr>
               <a:lnSpc>
@@ -3822,12 +3016,58 @@
                 <a:latin typeface="Open Sans"/>
                 <a:ea typeface="Open Sans"/>
               </a:rPr>
-              <a:t>What were the total Rental Orders Per Staff?</a:t>
+              <a:t>Query 1 - Rentals of the top 10 renting countries and the rest</a:t>
             </a:r>
             <a:endParaRPr b="0" lang="en-US" sz="2800" spc="-1" strike="noStrike">
-              <a:solidFill>
-                <a:srgbClr val="000000"/>
-              </a:solidFill>
+              <a:latin typeface="Arial"/>
+            </a:endParaRPr>
+          </a:p>
+        </p:txBody>
+      </p:sp>
+      <p:sp>
+        <p:nvSpPr>
+          <p:cNvPr id="47" name="CustomShape 3"/>
+          <p:cNvSpPr/>
+          <p:nvPr/>
+        </p:nvSpPr>
+        <p:spPr>
+          <a:xfrm>
+            <a:off x="5420160" y="2650320"/>
+            <a:ext cx="1337760" cy="261000"/>
+          </a:xfrm>
+          <a:prstGeom prst="rect">
+            <a:avLst/>
+          </a:prstGeom>
+          <a:noFill/>
+          <a:ln>
+            <a:noFill/>
+          </a:ln>
+        </p:spPr>
+        <p:style>
+          <a:lnRef idx="0"/>
+          <a:fillRef idx="0"/>
+          <a:effectRef idx="0"/>
+          <a:fontRef idx="minor"/>
+        </p:style>
+        <p:txBody>
+          <a:bodyPr lIns="90000" rIns="90000" tIns="45000" bIns="45000"/>
+          <a:p>
+            <a:pPr>
+              <a:lnSpc>
+                <a:spcPct val="100000"/>
+              </a:lnSpc>
+            </a:pPr>
+            <a:r>
+              <a:rPr b="0" lang="en-US" sz="1100" spc="-1" strike="noStrike">
+                <a:solidFill>
+                  <a:srgbClr val="595959"/>
+                </a:solidFill>
+                <a:latin typeface="Arial"/>
+                <a:ea typeface="Arial"/>
+              </a:rPr>
+              <a:t>Staff ID</a:t>
+            </a:r>
+            <a:endParaRPr b="0" lang="en-US" sz="1100" spc="-1" strike="noStrike">
               <a:latin typeface="Arial"/>
             </a:endParaRPr>
           </a:p>
@@ -3835,7 +3075,7 @@
       </p:sp>
       <p:pic>
         <p:nvPicPr>
-          <p:cNvPr id="48" name="Google Shape;56;p13" descr=""/>
+          <p:cNvPr id="48" name="" descr=""/>
           <p:cNvPicPr/>
           <p:nvPr/>
         </p:nvPicPr>
@@ -3845,8 +3085,8 @@
         </p:blipFill>
         <p:spPr>
           <a:xfrm>
-            <a:off x="620640" y="1266480"/>
-            <a:ext cx="5236560" cy="3464280"/>
+            <a:off x="290160" y="1188720"/>
+            <a:ext cx="6001200" cy="3474720"/>
           </a:xfrm>
           <a:prstGeom prst="rect">
             <a:avLst/>
@@ -3856,55 +3096,6 @@
           </a:ln>
         </p:spPr>
       </p:pic>
-      <p:sp>
-        <p:nvSpPr>
-          <p:cNvPr id="49" name="CustomShape 3"/>
-          <p:cNvSpPr/>
-          <p:nvPr/>
-        </p:nvSpPr>
-        <p:spPr>
-          <a:xfrm>
-            <a:off x="5420160" y="2650320"/>
-            <a:ext cx="1338120" cy="261360"/>
-          </a:xfrm>
-          <a:prstGeom prst="rect">
-            <a:avLst/>
-          </a:prstGeom>
-          <a:noFill/>
-          <a:ln>
-            <a:noFill/>
-          </a:ln>
-        </p:spPr>
-        <p:style>
-          <a:lnRef idx="0"/>
-          <a:fillRef idx="0"/>
-          <a:effectRef idx="0"/>
-          <a:fontRef idx="minor"/>
-        </p:style>
-        <p:txBody>
-          <a:bodyPr/>
-          <a:p>
-            <a:pPr>
-              <a:lnSpc>
-                <a:spcPct val="100000"/>
-              </a:lnSpc>
-            </a:pPr>
-            <a:r>
-              <a:rPr b="0" lang="en-US" sz="1100" spc="-1" strike="noStrike">
-                <a:solidFill>
-                  <a:srgbClr val="595959"/>
-                </a:solidFill>
-                <a:latin typeface="Arial"/>
-                <a:ea typeface="Arial"/>
-              </a:rPr>
-              <a:t>Staff ID</a:t>
-            </a:r>
-            <a:endParaRPr b="0" lang="en-US" sz="1100" spc="-1" strike="noStrike">
-              <a:latin typeface="Arial"/>
-            </a:endParaRPr>
-          </a:p>
-        </p:txBody>
-      </p:sp>
     </p:spTree>
   </p:cSld>
   <p:timing>
@@ -3956,14 +3147,14 @@
       </p:grpSpPr>
       <p:sp>
         <p:nvSpPr>
-          <p:cNvPr id="50" name="TextShape 1"/>
-          <p:cNvSpPr txBox="1"/>
+          <p:cNvPr id="49" name="CustomShape 1"/>
+          <p:cNvSpPr/>
           <p:nvPr/>
         </p:nvSpPr>
         <p:spPr>
           <a:xfrm>
-            <a:off x="6372360" y="1386000"/>
-            <a:ext cx="2376720" cy="3105000"/>
+            <a:off x="6372360" y="914400"/>
+            <a:ext cx="2588760" cy="4023360"/>
           </a:xfrm>
           <a:prstGeom prst="rect">
             <a:avLst/>
@@ -3978,8 +3169,14 @@
             <a:round/>
           </a:ln>
         </p:spPr>
-        <p:txBody>
-          <a:bodyPr tIns="91440" bIns="91440"/>
+        <p:style>
+          <a:lnRef idx="0"/>
+          <a:fillRef idx="0"/>
+          <a:effectRef idx="0"/>
+          <a:fontRef idx="minor"/>
+        </p:style>
+        <p:txBody>
+          <a:bodyPr lIns="90000" rIns="90000" tIns="91440" bIns="91440"/>
           <a:p>
             <a:pPr>
               <a:lnSpc>
@@ -3997,27 +3194,47 @@
                 <a:latin typeface="Open Sans"/>
                 <a:ea typeface="Open Sans"/>
               </a:rPr>
-              <a:t>We can see both store staff members filled in almost the same number of rental orders during each time unit.</a:t>
+              <a:t>How are the movies distributed by the amount of times they were rented inside of a category?</a:t>
             </a:r>
             <a:endParaRPr b="0" lang="en-US" sz="1400" spc="-1" strike="noStrike">
-              <a:solidFill>
-                <a:srgbClr val="000000"/>
-              </a:solidFill>
-              <a:latin typeface="Arial"/>
-            </a:endParaRPr>
-          </a:p>
-        </p:txBody>
-      </p:sp>
-      <p:sp>
-        <p:nvSpPr>
-          <p:cNvPr id="51" name="TextShape 2"/>
-          <p:cNvSpPr txBox="1"/>
+              <a:latin typeface="Arial"/>
+            </a:endParaRPr>
+          </a:p>
+          <a:p>
+            <a:pPr>
+              <a:lnSpc>
+                <a:spcPct val="115000"/>
+              </a:lnSpc>
+              <a:spcAft>
+                <a:spcPts val="1599"/>
+              </a:spcAft>
+            </a:pPr>
+            <a:r>
+              <a:rPr b="0" lang="en-US" sz="1400" spc="-1" strike="noStrike">
+                <a:solidFill>
+                  <a:srgbClr val="595959"/>
+                </a:solidFill>
+                <a:latin typeface="Open Sans"/>
+                <a:ea typeface="Open Sans"/>
+              </a:rPr>
+              <a:t>Description: This box and whisker chart shows the distribution of number of rentals of movies in each category.</a:t>
+            </a:r>
+            <a:endParaRPr b="0" lang="en-US" sz="1400" spc="-1" strike="noStrike">
+              <a:latin typeface="Arial"/>
+            </a:endParaRPr>
+          </a:p>
+        </p:txBody>
+      </p:sp>
+      <p:sp>
+        <p:nvSpPr>
+          <p:cNvPr id="50" name="CustomShape 2"/>
+          <p:cNvSpPr/>
           <p:nvPr/>
         </p:nvSpPr>
         <p:spPr>
           <a:xfrm>
             <a:off x="0" y="0"/>
-            <a:ext cx="9143640" cy="795240"/>
+            <a:ext cx="9143280" cy="794880"/>
           </a:xfrm>
           <a:prstGeom prst="rect">
             <a:avLst/>
@@ -4029,8 +3246,14 @@
             <a:noFill/>
           </a:ln>
         </p:spPr>
-        <p:txBody>
-          <a:bodyPr tIns="91440" bIns="91440" anchor="ctr"/>
+        <p:style>
+          <a:lnRef idx="0"/>
+          <a:fillRef idx="0"/>
+          <a:effectRef idx="0"/>
+          <a:fontRef idx="minor"/>
+        </p:style>
+        <p:txBody>
+          <a:bodyPr lIns="90000" rIns="90000" tIns="91440" bIns="91440" anchor="ctr"/>
           <a:p>
             <a:pPr>
               <a:lnSpc>
@@ -4045,12 +3268,58 @@
                 <a:latin typeface="Open Sans"/>
                 <a:ea typeface="Open Sans"/>
               </a:rPr>
-              <a:t>What were the total Rental Orders Per Staff?</a:t>
+              <a:t>Query 2 - Film rentals distribution by category</a:t>
             </a:r>
             <a:endParaRPr b="0" lang="en-US" sz="2800" spc="-1" strike="noStrike">
-              <a:solidFill>
-                <a:srgbClr val="000000"/>
-              </a:solidFill>
+              <a:latin typeface="Arial"/>
+            </a:endParaRPr>
+          </a:p>
+        </p:txBody>
+      </p:sp>
+      <p:sp>
+        <p:nvSpPr>
+          <p:cNvPr id="51" name="CustomShape 3"/>
+          <p:cNvSpPr/>
+          <p:nvPr/>
+        </p:nvSpPr>
+        <p:spPr>
+          <a:xfrm>
+            <a:off x="5420160" y="2650320"/>
+            <a:ext cx="1337760" cy="261000"/>
+          </a:xfrm>
+          <a:prstGeom prst="rect">
+            <a:avLst/>
+          </a:prstGeom>
+          <a:noFill/>
+          <a:ln>
+            <a:noFill/>
+          </a:ln>
+        </p:spPr>
+        <p:style>
+          <a:lnRef idx="0"/>
+          <a:fillRef idx="0"/>
+          <a:effectRef idx="0"/>
+          <a:fontRef idx="minor"/>
+        </p:style>
+        <p:txBody>
+          <a:bodyPr lIns="90000" rIns="90000" tIns="45000" bIns="45000"/>
+          <a:p>
+            <a:pPr>
+              <a:lnSpc>
+                <a:spcPct val="100000"/>
+              </a:lnSpc>
+            </a:pPr>
+            <a:r>
+              <a:rPr b="0" lang="en-US" sz="1100" spc="-1" strike="noStrike">
+                <a:solidFill>
+                  <a:srgbClr val="595959"/>
+                </a:solidFill>
+                <a:latin typeface="Arial"/>
+                <a:ea typeface="Arial"/>
+              </a:rPr>
+              <a:t>Staff ID</a:t>
+            </a:r>
+            <a:endParaRPr b="0" lang="en-US" sz="1100" spc="-1" strike="noStrike">
               <a:latin typeface="Arial"/>
             </a:endParaRPr>
           </a:p>
@@ -4058,7 +3327,7 @@
       </p:sp>
       <p:pic>
         <p:nvPicPr>
-          <p:cNvPr id="52" name="Google Shape;56;p13" descr=""/>
+          <p:cNvPr id="52" name="" descr=""/>
           <p:cNvPicPr/>
           <p:nvPr/>
         </p:nvPicPr>
@@ -4068,8 +3337,8 @@
         </p:blipFill>
         <p:spPr>
           <a:xfrm>
-            <a:off x="620640" y="1266480"/>
-            <a:ext cx="5236560" cy="3464280"/>
+            <a:off x="182880" y="1097280"/>
+            <a:ext cx="6075360" cy="3617280"/>
           </a:xfrm>
           <a:prstGeom prst="rect">
             <a:avLst/>
@@ -4079,55 +3348,6 @@
           </a:ln>
         </p:spPr>
       </p:pic>
-      <p:sp>
-        <p:nvSpPr>
-          <p:cNvPr id="53" name="CustomShape 3"/>
-          <p:cNvSpPr/>
-          <p:nvPr/>
-        </p:nvSpPr>
-        <p:spPr>
-          <a:xfrm>
-            <a:off x="5420160" y="2650320"/>
-            <a:ext cx="1338120" cy="261360"/>
-          </a:xfrm>
-          <a:prstGeom prst="rect">
-            <a:avLst/>
-          </a:prstGeom>
-          <a:noFill/>
-          <a:ln>
-            <a:noFill/>
-          </a:ln>
-        </p:spPr>
-        <p:style>
-          <a:lnRef idx="0"/>
-          <a:fillRef idx="0"/>
-          <a:effectRef idx="0"/>
-          <a:fontRef idx="minor"/>
-        </p:style>
-        <p:txBody>
-          <a:bodyPr/>
-          <a:p>
-            <a:pPr>
-              <a:lnSpc>
-                <a:spcPct val="100000"/>
-              </a:lnSpc>
-            </a:pPr>
-            <a:r>
-              <a:rPr b="0" lang="en-US" sz="1100" spc="-1" strike="noStrike">
-                <a:solidFill>
-                  <a:srgbClr val="595959"/>
-                </a:solidFill>
-                <a:latin typeface="Arial"/>
-                <a:ea typeface="Arial"/>
-              </a:rPr>
-              <a:t>Staff ID</a:t>
-            </a:r>
-            <a:endParaRPr b="0" lang="en-US" sz="1100" spc="-1" strike="noStrike">
-              <a:latin typeface="Arial"/>
-            </a:endParaRPr>
-          </a:p>
-        </p:txBody>
-      </p:sp>
     </p:spTree>
   </p:cSld>
   <p:timing>
@@ -4179,14 +3399,14 @@
       </p:grpSpPr>
       <p:sp>
         <p:nvSpPr>
-          <p:cNvPr id="54" name="TextShape 1"/>
-          <p:cNvSpPr txBox="1"/>
+          <p:cNvPr id="53" name="CustomShape 1"/>
+          <p:cNvSpPr/>
           <p:nvPr/>
         </p:nvSpPr>
         <p:spPr>
           <a:xfrm>
-            <a:off x="6372360" y="1386000"/>
-            <a:ext cx="2376720" cy="3105000"/>
+            <a:off x="6372360" y="914400"/>
+            <a:ext cx="2588760" cy="4023360"/>
           </a:xfrm>
           <a:prstGeom prst="rect">
             <a:avLst/>
@@ -4201,8 +3421,14 @@
             <a:round/>
           </a:ln>
         </p:spPr>
-        <p:txBody>
-          <a:bodyPr tIns="91440" bIns="91440"/>
+        <p:style>
+          <a:lnRef idx="0"/>
+          <a:fillRef idx="0"/>
+          <a:effectRef idx="0"/>
+          <a:fontRef idx="minor"/>
+        </p:style>
+        <p:txBody>
+          <a:bodyPr lIns="90000" rIns="90000" tIns="91440" bIns="91440"/>
           <a:p>
             <a:pPr>
               <a:lnSpc>
@@ -4220,27 +3446,47 @@
                 <a:latin typeface="Open Sans"/>
                 <a:ea typeface="Open Sans"/>
               </a:rPr>
-              <a:t>We can see both store staff members filled in almost the same number of rental orders during each time unit.</a:t>
+              <a:t>How much did the top 10 paying customers spend on DVD rental over 2007?</a:t>
             </a:r>
             <a:endParaRPr b="0" lang="en-US" sz="1400" spc="-1" strike="noStrike">
-              <a:solidFill>
-                <a:srgbClr val="000000"/>
-              </a:solidFill>
-              <a:latin typeface="Arial"/>
-            </a:endParaRPr>
-          </a:p>
-        </p:txBody>
-      </p:sp>
-      <p:sp>
-        <p:nvSpPr>
-          <p:cNvPr id="55" name="TextShape 2"/>
-          <p:cNvSpPr txBox="1"/>
+              <a:latin typeface="Arial"/>
+            </a:endParaRPr>
+          </a:p>
+          <a:p>
+            <a:pPr>
+              <a:lnSpc>
+                <a:spcPct val="115000"/>
+              </a:lnSpc>
+              <a:spcAft>
+                <a:spcPts val="1599"/>
+              </a:spcAft>
+            </a:pPr>
+            <a:r>
+              <a:rPr b="0" lang="en-US" sz="1400" spc="-1" strike="noStrike">
+                <a:solidFill>
+                  <a:srgbClr val="595959"/>
+                </a:solidFill>
+                <a:latin typeface="Open Sans"/>
+                <a:ea typeface="Open Sans"/>
+              </a:rPr>
+              <a:t>Description: this chart shows the spending pattern of the all-time top 10 paying customers. The plotted line represents the average spent by each customer individually from February, 2007 to April, 2007, and it works as comparison between customers.</a:t>
+            </a:r>
+            <a:endParaRPr b="0" lang="en-US" sz="1400" spc="-1" strike="noStrike">
+              <a:latin typeface="Arial"/>
+            </a:endParaRPr>
+          </a:p>
+        </p:txBody>
+      </p:sp>
+      <p:sp>
+        <p:nvSpPr>
+          <p:cNvPr id="54" name="CustomShape 2"/>
+          <p:cNvSpPr/>
           <p:nvPr/>
         </p:nvSpPr>
         <p:spPr>
           <a:xfrm>
             <a:off x="0" y="0"/>
-            <a:ext cx="9143640" cy="795240"/>
+            <a:ext cx="9143280" cy="794880"/>
           </a:xfrm>
           <a:prstGeom prst="rect">
             <a:avLst/>
@@ -4252,8 +3498,14 @@
             <a:noFill/>
           </a:ln>
         </p:spPr>
-        <p:txBody>
-          <a:bodyPr tIns="91440" bIns="91440" anchor="ctr"/>
+        <p:style>
+          <a:lnRef idx="0"/>
+          <a:fillRef idx="0"/>
+          <a:effectRef idx="0"/>
+          <a:fontRef idx="minor"/>
+        </p:style>
+        <p:txBody>
+          <a:bodyPr lIns="90000" rIns="90000" tIns="91440" bIns="91440" anchor="ctr"/>
           <a:p>
             <a:pPr>
               <a:lnSpc>
@@ -4268,12 +3520,58 @@
                 <a:latin typeface="Open Sans"/>
                 <a:ea typeface="Open Sans"/>
               </a:rPr>
-              <a:t>What were the total Rental Orders Per Staff?</a:t>
+              <a:t>Query 3 - Amount spent by the top 10 paying customers between February and April 2007</a:t>
             </a:r>
             <a:endParaRPr b="0" lang="en-US" sz="2800" spc="-1" strike="noStrike">
-              <a:solidFill>
-                <a:srgbClr val="000000"/>
-              </a:solidFill>
+              <a:latin typeface="Arial"/>
+            </a:endParaRPr>
+          </a:p>
+        </p:txBody>
+      </p:sp>
+      <p:sp>
+        <p:nvSpPr>
+          <p:cNvPr id="55" name="CustomShape 3"/>
+          <p:cNvSpPr/>
+          <p:nvPr/>
+        </p:nvSpPr>
+        <p:spPr>
+          <a:xfrm>
+            <a:off x="5420160" y="2650320"/>
+            <a:ext cx="1337760" cy="261000"/>
+          </a:xfrm>
+          <a:prstGeom prst="rect">
+            <a:avLst/>
+          </a:prstGeom>
+          <a:noFill/>
+          <a:ln>
+            <a:noFill/>
+          </a:ln>
+        </p:spPr>
+        <p:style>
+          <a:lnRef idx="0"/>
+          <a:fillRef idx="0"/>
+          <a:effectRef idx="0"/>
+          <a:fontRef idx="minor"/>
+        </p:style>
+        <p:txBody>
+          <a:bodyPr lIns="90000" rIns="90000" tIns="45000" bIns="45000"/>
+          <a:p>
+            <a:pPr>
+              <a:lnSpc>
+                <a:spcPct val="100000"/>
+              </a:lnSpc>
+            </a:pPr>
+            <a:r>
+              <a:rPr b="0" lang="en-US" sz="1100" spc="-1" strike="noStrike">
+                <a:solidFill>
+                  <a:srgbClr val="595959"/>
+                </a:solidFill>
+                <a:latin typeface="Arial"/>
+                <a:ea typeface="Arial"/>
+              </a:rPr>
+              <a:t>Staff ID</a:t>
+            </a:r>
+            <a:endParaRPr b="0" lang="en-US" sz="1100" spc="-1" strike="noStrike">
               <a:latin typeface="Arial"/>
             </a:endParaRPr>
           </a:p>
@@ -4281,7 +3579,7 @@
       </p:sp>
       <p:pic>
         <p:nvPicPr>
-          <p:cNvPr id="56" name="Google Shape;56;p13" descr=""/>
+          <p:cNvPr id="56" name="" descr=""/>
           <p:cNvPicPr/>
           <p:nvPr/>
         </p:nvPicPr>
@@ -4291,8 +3589,8 @@
         </p:blipFill>
         <p:spPr>
           <a:xfrm>
-            <a:off x="620640" y="1266480"/>
-            <a:ext cx="5236560" cy="3464280"/>
+            <a:off x="132480" y="1280160"/>
+            <a:ext cx="6176880" cy="3474720"/>
           </a:xfrm>
           <a:prstGeom prst="rect">
             <a:avLst/>
@@ -4302,55 +3600,6 @@
           </a:ln>
         </p:spPr>
       </p:pic>
-      <p:sp>
-        <p:nvSpPr>
-          <p:cNvPr id="57" name="CustomShape 3"/>
-          <p:cNvSpPr/>
-          <p:nvPr/>
-        </p:nvSpPr>
-        <p:spPr>
-          <a:xfrm>
-            <a:off x="5420160" y="2650320"/>
-            <a:ext cx="1338120" cy="261360"/>
-          </a:xfrm>
-          <a:prstGeom prst="rect">
-            <a:avLst/>
-          </a:prstGeom>
-          <a:noFill/>
-          <a:ln>
-            <a:noFill/>
-          </a:ln>
-        </p:spPr>
-        <p:style>
-          <a:lnRef idx="0"/>
-          <a:fillRef idx="0"/>
-          <a:effectRef idx="0"/>
-          <a:fontRef idx="minor"/>
-        </p:style>
-        <p:txBody>
-          <a:bodyPr/>
-          <a:p>
-            <a:pPr>
-              <a:lnSpc>
-                <a:spcPct val="100000"/>
-              </a:lnSpc>
-            </a:pPr>
-            <a:r>
-              <a:rPr b="0" lang="en-US" sz="1100" spc="-1" strike="noStrike">
-                <a:solidFill>
-                  <a:srgbClr val="595959"/>
-                </a:solidFill>
-                <a:latin typeface="Arial"/>
-                <a:ea typeface="Arial"/>
-              </a:rPr>
-              <a:t>Staff ID</a:t>
-            </a:r>
-            <a:endParaRPr b="0" lang="en-US" sz="1100" spc="-1" strike="noStrike">
-              <a:latin typeface="Arial"/>
-            </a:endParaRPr>
-          </a:p>
-        </p:txBody>
-      </p:sp>
     </p:spTree>
   </p:cSld>
   <p:timing>
@@ -4402,14 +3651,14 @@
       </p:grpSpPr>
       <p:sp>
         <p:nvSpPr>
-          <p:cNvPr id="58" name="TextShape 1"/>
-          <p:cNvSpPr txBox="1"/>
+          <p:cNvPr id="57" name="CustomShape 1"/>
+          <p:cNvSpPr/>
           <p:nvPr/>
         </p:nvSpPr>
         <p:spPr>
           <a:xfrm>
-            <a:off x="6372360" y="1386000"/>
-            <a:ext cx="2376720" cy="3105000"/>
+            <a:off x="6035040" y="914400"/>
+            <a:ext cx="3017520" cy="4023360"/>
           </a:xfrm>
           <a:prstGeom prst="rect">
             <a:avLst/>
@@ -4424,8 +3673,14 @@
             <a:round/>
           </a:ln>
         </p:spPr>
-        <p:txBody>
-          <a:bodyPr tIns="91440" bIns="91440"/>
+        <p:style>
+          <a:lnRef idx="0"/>
+          <a:fillRef idx="0"/>
+          <a:effectRef idx="0"/>
+          <a:fontRef idx="minor"/>
+        </p:style>
+        <p:txBody>
+          <a:bodyPr lIns="90000" rIns="90000" tIns="91440" bIns="91440"/>
           <a:p>
             <a:pPr>
               <a:lnSpc>
@@ -4443,27 +3698,47 @@
                 <a:latin typeface="Open Sans"/>
                 <a:ea typeface="Open Sans"/>
               </a:rPr>
-              <a:t>We can see both store staff members filled in almost the same number of rental orders during each time unit.</a:t>
+              <a:t>How many customers have paid less in rentals compared to the previous month?</a:t>
             </a:r>
             <a:endParaRPr b="0" lang="en-US" sz="1400" spc="-1" strike="noStrike">
-              <a:solidFill>
-                <a:srgbClr val="000000"/>
-              </a:solidFill>
-              <a:latin typeface="Arial"/>
-            </a:endParaRPr>
-          </a:p>
-        </p:txBody>
-      </p:sp>
-      <p:sp>
-        <p:nvSpPr>
-          <p:cNvPr id="59" name="TextShape 2"/>
-          <p:cNvSpPr txBox="1"/>
+              <a:latin typeface="Arial"/>
+            </a:endParaRPr>
+          </a:p>
+          <a:p>
+            <a:pPr>
+              <a:lnSpc>
+                <a:spcPct val="115000"/>
+              </a:lnSpc>
+              <a:spcAft>
+                <a:spcPts val="1599"/>
+              </a:spcAft>
+            </a:pPr>
+            <a:r>
+              <a:rPr b="0" lang="en-US" sz="1400" spc="-1" strike="noStrike">
+                <a:solidFill>
+                  <a:srgbClr val="595959"/>
+                </a:solidFill>
+                <a:latin typeface="Open Sans"/>
+                <a:ea typeface="Open Sans"/>
+              </a:rPr>
+              <a:t>Description: this chart shows the amount and proportion of customers that have decreased the amount spent in rentals when compared to the previous month. The chart suggests the beginning of a downward trend in amount spent by customers, although the data is insufficient to show an actual trend in customers’ behavior.</a:t>
+            </a:r>
+            <a:endParaRPr b="0" lang="en-US" sz="1400" spc="-1" strike="noStrike">
+              <a:latin typeface="Arial"/>
+            </a:endParaRPr>
+          </a:p>
+        </p:txBody>
+      </p:sp>
+      <p:sp>
+        <p:nvSpPr>
+          <p:cNvPr id="58" name="CustomShape 2"/>
+          <p:cNvSpPr/>
           <p:nvPr/>
         </p:nvSpPr>
         <p:spPr>
           <a:xfrm>
             <a:off x="0" y="0"/>
-            <a:ext cx="9143640" cy="795240"/>
+            <a:ext cx="9143280" cy="794880"/>
           </a:xfrm>
           <a:prstGeom prst="rect">
             <a:avLst/>
@@ -4475,8 +3750,14 @@
             <a:noFill/>
           </a:ln>
         </p:spPr>
-        <p:txBody>
-          <a:bodyPr tIns="91440" bIns="91440" anchor="ctr"/>
+        <p:style>
+          <a:lnRef idx="0"/>
+          <a:fillRef idx="0"/>
+          <a:effectRef idx="0"/>
+          <a:fontRef idx="minor"/>
+        </p:style>
+        <p:txBody>
+          <a:bodyPr lIns="90000" rIns="90000" tIns="91440" bIns="91440" anchor="ctr"/>
           <a:p>
             <a:pPr>
               <a:lnSpc>
@@ -4491,12 +3772,9 @@
                 <a:latin typeface="Open Sans"/>
                 <a:ea typeface="Open Sans"/>
               </a:rPr>
-              <a:t>What were the total Rental Orders Per Staff?</a:t>
+              <a:t>Query 4 - Amount spent in rentals compared to the previous month</a:t>
             </a:r>
             <a:endParaRPr b="0" lang="en-US" sz="2800" spc="-1" strike="noStrike">
-              <a:solidFill>
-                <a:srgbClr val="000000"/>
-              </a:solidFill>
               <a:latin typeface="Arial"/>
             </a:endParaRPr>
           </a:p>
@@ -4504,7 +3782,7 @@
       </p:sp>
       <p:pic>
         <p:nvPicPr>
-          <p:cNvPr id="60" name="Google Shape;56;p13" descr=""/>
+          <p:cNvPr id="59" name="" descr=""/>
           <p:cNvPicPr/>
           <p:nvPr/>
         </p:nvPicPr>
@@ -4514,8 +3792,8 @@
         </p:blipFill>
         <p:spPr>
           <a:xfrm>
-            <a:off x="620640" y="1266480"/>
-            <a:ext cx="5236560" cy="3464280"/>
+            <a:off x="198720" y="1463040"/>
+            <a:ext cx="5759280" cy="3200400"/>
           </a:xfrm>
           <a:prstGeom prst="rect">
             <a:avLst/>
@@ -4525,55 +3803,6 @@
           </a:ln>
         </p:spPr>
       </p:pic>
-      <p:sp>
-        <p:nvSpPr>
-          <p:cNvPr id="61" name="CustomShape 3"/>
-          <p:cNvSpPr/>
-          <p:nvPr/>
-        </p:nvSpPr>
-        <p:spPr>
-          <a:xfrm>
-            <a:off x="5420160" y="2650320"/>
-            <a:ext cx="1338120" cy="261360"/>
-          </a:xfrm>
-          <a:prstGeom prst="rect">
-            <a:avLst/>
-          </a:prstGeom>
-          <a:noFill/>
-          <a:ln>
-            <a:noFill/>
-          </a:ln>
-        </p:spPr>
-        <p:style>
-          <a:lnRef idx="0"/>
-          <a:fillRef idx="0"/>
-          <a:effectRef idx="0"/>
-          <a:fontRef idx="minor"/>
-        </p:style>
-        <p:txBody>
-          <a:bodyPr/>
-          <a:p>
-            <a:pPr>
-              <a:lnSpc>
-                <a:spcPct val="100000"/>
-              </a:lnSpc>
-            </a:pPr>
-            <a:r>
-              <a:rPr b="0" lang="en-US" sz="1100" spc="-1" strike="noStrike">
-                <a:solidFill>
-                  <a:srgbClr val="595959"/>
-                </a:solidFill>
-                <a:latin typeface="Arial"/>
-                <a:ea typeface="Arial"/>
-              </a:rPr>
-              <a:t>Staff ID</a:t>
-            </a:r>
-            <a:endParaRPr b="0" lang="en-US" sz="1100" spc="-1" strike="noStrike">
-              <a:latin typeface="Arial"/>
-            </a:endParaRPr>
-          </a:p>
-        </p:txBody>
-      </p:sp>
     </p:spTree>
   </p:cSld>
   <p:timing>

</xml_diff>